<commit_message>
Trainer Daemon Module Interaction Page added to Architecture & Design Document
</commit_message>
<xml_diff>
--- a/Documents/News Recommendation Architecture.pptx
+++ b/Documents/News Recommendation Architecture.pptx
@@ -10,13 +10,14 @@
     <p:sldId id="264" r:id="rId4"/>
     <p:sldId id="265" r:id="rId5"/>
     <p:sldId id="266" r:id="rId6"/>
-    <p:sldId id="269" r:id="rId7"/>
-    <p:sldId id="267" r:id="rId8"/>
-    <p:sldId id="270" r:id="rId9"/>
-    <p:sldId id="268" r:id="rId10"/>
-    <p:sldId id="271" r:id="rId11"/>
-    <p:sldId id="272" r:id="rId12"/>
-    <p:sldId id="273" r:id="rId13"/>
+    <p:sldId id="274" r:id="rId7"/>
+    <p:sldId id="269" r:id="rId8"/>
+    <p:sldId id="267" r:id="rId9"/>
+    <p:sldId id="270" r:id="rId10"/>
+    <p:sldId id="268" r:id="rId11"/>
+    <p:sldId id="271" r:id="rId12"/>
+    <p:sldId id="272" r:id="rId13"/>
+    <p:sldId id="273" r:id="rId14"/>
   </p:sldIdLst>
   <p:sldSz cx="9144000" cy="6858000" type="screen4x3"/>
   <p:notesSz cx="6858000" cy="9144000"/>
@@ -299,7 +300,7 @@
           <a:p>
             <a:fld id="{57F9AAD8-6CF3-4D4F-B6D8-63847D6A49C6}" type="datetimeFigureOut">
               <a:rPr lang="en-US" smtClean="0"/>
-              <a:t>13. 4. 16.</a:t>
+              <a:t>13. 4. 17.</a:t>
             </a:fld>
             <a:endParaRPr lang="en-US"/>
           </a:p>
@@ -469,7 +470,7 @@
           <a:p>
             <a:fld id="{57F9AAD8-6CF3-4D4F-B6D8-63847D6A49C6}" type="datetimeFigureOut">
               <a:rPr lang="en-US" smtClean="0"/>
-              <a:t>13. 4. 16.</a:t>
+              <a:t>13. 4. 17.</a:t>
             </a:fld>
             <a:endParaRPr lang="en-US"/>
           </a:p>
@@ -649,7 +650,7 @@
           <a:p>
             <a:fld id="{57F9AAD8-6CF3-4D4F-B6D8-63847D6A49C6}" type="datetimeFigureOut">
               <a:rPr lang="en-US" smtClean="0"/>
-              <a:t>13. 4. 16.</a:t>
+              <a:t>13. 4. 17.</a:t>
             </a:fld>
             <a:endParaRPr lang="en-US"/>
           </a:p>
@@ -819,7 +820,7 @@
           <a:p>
             <a:fld id="{57F9AAD8-6CF3-4D4F-B6D8-63847D6A49C6}" type="datetimeFigureOut">
               <a:rPr lang="en-US" smtClean="0"/>
-              <a:t>13. 4. 16.</a:t>
+              <a:t>13. 4. 17.</a:t>
             </a:fld>
             <a:endParaRPr lang="en-US"/>
           </a:p>
@@ -1065,7 +1066,7 @@
           <a:p>
             <a:fld id="{57F9AAD8-6CF3-4D4F-B6D8-63847D6A49C6}" type="datetimeFigureOut">
               <a:rPr lang="en-US" smtClean="0"/>
-              <a:t>13. 4. 16.</a:t>
+              <a:t>13. 4. 17.</a:t>
             </a:fld>
             <a:endParaRPr lang="en-US"/>
           </a:p>
@@ -1353,7 +1354,7 @@
           <a:p>
             <a:fld id="{57F9AAD8-6CF3-4D4F-B6D8-63847D6A49C6}" type="datetimeFigureOut">
               <a:rPr lang="en-US" smtClean="0"/>
-              <a:t>13. 4. 16.</a:t>
+              <a:t>13. 4. 17.</a:t>
             </a:fld>
             <a:endParaRPr lang="en-US"/>
           </a:p>
@@ -1775,7 +1776,7 @@
           <a:p>
             <a:fld id="{57F9AAD8-6CF3-4D4F-B6D8-63847D6A49C6}" type="datetimeFigureOut">
               <a:rPr lang="en-US" smtClean="0"/>
-              <a:t>13. 4. 16.</a:t>
+              <a:t>13. 4. 17.</a:t>
             </a:fld>
             <a:endParaRPr lang="en-US"/>
           </a:p>
@@ -1893,7 +1894,7 @@
           <a:p>
             <a:fld id="{57F9AAD8-6CF3-4D4F-B6D8-63847D6A49C6}" type="datetimeFigureOut">
               <a:rPr lang="en-US" smtClean="0"/>
-              <a:t>13. 4. 16.</a:t>
+              <a:t>13. 4. 17.</a:t>
             </a:fld>
             <a:endParaRPr lang="en-US"/>
           </a:p>
@@ -1988,7 +1989,7 @@
           <a:p>
             <a:fld id="{57F9AAD8-6CF3-4D4F-B6D8-63847D6A49C6}" type="datetimeFigureOut">
               <a:rPr lang="en-US" smtClean="0"/>
-              <a:t>13. 4. 16.</a:t>
+              <a:t>13. 4. 17.</a:t>
             </a:fld>
             <a:endParaRPr lang="en-US"/>
           </a:p>
@@ -2265,7 +2266,7 @@
           <a:p>
             <a:fld id="{57F9AAD8-6CF3-4D4F-B6D8-63847D6A49C6}" type="datetimeFigureOut">
               <a:rPr lang="en-US" smtClean="0"/>
-              <a:t>13. 4. 16.</a:t>
+              <a:t>13. 4. 17.</a:t>
             </a:fld>
             <a:endParaRPr lang="en-US"/>
           </a:p>
@@ -2518,7 +2519,7 @@
           <a:p>
             <a:fld id="{57F9AAD8-6CF3-4D4F-B6D8-63847D6A49C6}" type="datetimeFigureOut">
               <a:rPr lang="en-US" smtClean="0"/>
-              <a:t>13. 4. 16.</a:t>
+              <a:t>13. 4. 17.</a:t>
             </a:fld>
             <a:endParaRPr lang="en-US"/>
           </a:p>
@@ -2731,7 +2732,7 @@
           <a:p>
             <a:fld id="{57F9AAD8-6CF3-4D4F-B6D8-63847D6A49C6}" type="datetimeFigureOut">
               <a:rPr lang="en-US" smtClean="0"/>
-              <a:t>13. 4. 16.</a:t>
+              <a:t>13. 4. 17.</a:t>
             </a:fld>
             <a:endParaRPr lang="en-US"/>
           </a:p>
@@ -3123,11 +3124,7 @@
           <a:p>
             <a:r>
               <a:rPr lang="en-US" dirty="0" smtClean="0"/>
-              <a:t>SNS News </a:t>
-            </a:r>
-            <a:r>
-              <a:rPr lang="en-US" dirty="0" smtClean="0"/>
-              <a:t>Recommendation Architecture &amp; Design</a:t>
+              <a:t>SNS News Recommendation Architecture &amp; Design</a:t>
             </a:r>
             <a:endParaRPr lang="en-US" dirty="0"/>
           </a:p>
@@ -3156,11 +3153,7 @@
           <a:p>
             <a:r>
               <a:rPr lang="ko-KR" altLang="en-US" dirty="0" smtClean="0"/>
-              <a:t>임베디드 </a:t>
-            </a:r>
-            <a:r>
-              <a:rPr lang="ko-KR" altLang="en-US" dirty="0" smtClean="0"/>
-              <a:t>시스템 연구실</a:t>
+              <a:t>임베디드 시스템 연구실</a:t>
             </a:r>
             <a:endParaRPr lang="en-US" altLang="ko-KR" dirty="0" smtClean="0"/>
           </a:p>
@@ -3236,7 +3229,7 @@
           <a:p>
             <a:r>
               <a:rPr lang="en-US" dirty="0" smtClean="0"/>
-              <a:t>D2V API</a:t>
+              <a:t>Major Software Components</a:t>
             </a:r>
             <a:endParaRPr lang="en-US" dirty="0"/>
           </a:p>
@@ -3254,13 +3247,64 @@
         </p:nvSpPr>
         <p:spPr/>
         <p:txBody>
-          <a:bodyPr/>
-          <a:lstStyle/>
-          <a:p>
-            <a:r>
-              <a:rPr lang="en-US" dirty="0" smtClean="0"/>
-              <a:t>TBD</a:t>
-            </a:r>
+          <a:bodyPr>
+            <a:normAutofit lnSpcReduction="10000"/>
+          </a:bodyPr>
+          <a:lstStyle/>
+          <a:p>
+            <a:r>
+              <a:rPr lang="en-US" dirty="0" smtClean="0"/>
+              <a:t>D2V: Document to Vector</a:t>
+            </a:r>
+          </a:p>
+          <a:p>
+            <a:pPr lvl="1"/>
+            <a:r>
+              <a:rPr lang="en-US" dirty="0" smtClean="0"/>
+              <a:t>Converts Plain Text to Document Vector</a:t>
+            </a:r>
+          </a:p>
+          <a:p>
+            <a:pPr lvl="1"/>
+            <a:r>
+              <a:rPr lang="en-US" dirty="0" smtClean="0"/>
+              <a:t>Manages Global Term ID Table (Shared Across Conversion Sessions)</a:t>
+            </a:r>
+          </a:p>
+          <a:p>
+            <a:r>
+              <a:rPr lang="en-US" dirty="0" smtClean="0"/>
+              <a:t>NVE: Naïve Bayesian Evaluation</a:t>
+            </a:r>
+          </a:p>
+          <a:p>
+            <a:pPr lvl="1"/>
+            <a:r>
+              <a:rPr lang="en-US" dirty="0" smtClean="0"/>
+              <a:t>CUDA Accelerated Naïve Bayesian Algorithm</a:t>
+            </a:r>
+          </a:p>
+          <a:p>
+            <a:pPr lvl="1"/>
+            <a:r>
+              <a:rPr lang="en-US" dirty="0" smtClean="0"/>
+              <a:t>Score Similarity of a Document Vector and PDVL</a:t>
+            </a:r>
+          </a:p>
+          <a:p>
+            <a:r>
+              <a:rPr lang="en-US" dirty="0" smtClean="0"/>
+              <a:t>Content Extraction</a:t>
+            </a:r>
+          </a:p>
+          <a:p>
+            <a:pPr lvl="1"/>
+            <a:r>
+              <a:rPr lang="en-US" dirty="0" smtClean="0"/>
+              <a:t>Strips out HTML tags from Internet News Article</a:t>
+            </a:r>
+          </a:p>
+          <a:p>
             <a:endParaRPr lang="en-US" dirty="0"/>
           </a:p>
         </p:txBody>
@@ -3268,7 +3312,7 @@
     </p:spTree>
     <p:extLst>
       <p:ext uri="{BB962C8B-B14F-4D97-AF65-F5344CB8AC3E}">
-        <p14:creationId xmlns:p14="http://schemas.microsoft.com/office/powerpoint/2010/main" val="4216479453"/>
+        <p14:creationId xmlns:p14="http://schemas.microsoft.com/office/powerpoint/2010/main" val="326765645"/>
       </p:ext>
     </p:extLst>
   </p:cSld>
@@ -3312,6 +3356,82 @@
           <a:p>
             <a:r>
               <a:rPr lang="en-US" dirty="0" smtClean="0"/>
+              <a:t>D2V API</a:t>
+            </a:r>
+            <a:endParaRPr lang="en-US" dirty="0"/>
+          </a:p>
+        </p:txBody>
+      </p:sp>
+      <p:sp>
+        <p:nvSpPr>
+          <p:cNvPr id="3" name="Content Placeholder 2"/>
+          <p:cNvSpPr>
+            <a:spLocks noGrp="1"/>
+          </p:cNvSpPr>
+          <p:nvPr>
+            <p:ph idx="1"/>
+          </p:nvPr>
+        </p:nvSpPr>
+        <p:spPr/>
+        <p:txBody>
+          <a:bodyPr/>
+          <a:lstStyle/>
+          <a:p>
+            <a:r>
+              <a:rPr lang="en-US" dirty="0" smtClean="0"/>
+              <a:t>TBD</a:t>
+            </a:r>
+            <a:endParaRPr lang="en-US" dirty="0"/>
+          </a:p>
+        </p:txBody>
+      </p:sp>
+    </p:spTree>
+    <p:extLst>
+      <p:ext uri="{BB962C8B-B14F-4D97-AF65-F5344CB8AC3E}">
+        <p14:creationId xmlns:p14="http://schemas.microsoft.com/office/powerpoint/2010/main" val="4216479453"/>
+      </p:ext>
+    </p:extLst>
+  </p:cSld>
+  <p:clrMapOvr>
+    <a:masterClrMapping/>
+  </p:clrMapOvr>
+</p:sld>
+</file>
+
+<file path=ppt/slides/slide12.xml><?xml version="1.0" encoding="utf-8"?>
+<p:sld xmlns:a="http://schemas.openxmlformats.org/drawingml/2006/main" xmlns:r="http://schemas.openxmlformats.org/officeDocument/2006/relationships" xmlns:p="http://schemas.openxmlformats.org/presentationml/2006/main">
+  <p:cSld>
+    <p:spTree>
+      <p:nvGrpSpPr>
+        <p:cNvPr id="1" name=""/>
+        <p:cNvGrpSpPr/>
+        <p:nvPr/>
+      </p:nvGrpSpPr>
+      <p:grpSpPr>
+        <a:xfrm>
+          <a:off x="0" y="0"/>
+          <a:ext cx="0" cy="0"/>
+          <a:chOff x="0" y="0"/>
+          <a:chExt cx="0" cy="0"/>
+        </a:xfrm>
+      </p:grpSpPr>
+      <p:sp>
+        <p:nvSpPr>
+          <p:cNvPr id="2" name="Title 1"/>
+          <p:cNvSpPr>
+            <a:spLocks noGrp="1"/>
+          </p:cNvSpPr>
+          <p:nvPr>
+            <p:ph type="title"/>
+          </p:nvPr>
+        </p:nvSpPr>
+        <p:spPr/>
+        <p:txBody>
+          <a:bodyPr/>
+          <a:lstStyle/>
+          <a:p>
+            <a:r>
+              <a:rPr lang="en-US" dirty="0" smtClean="0"/>
               <a:t>NVE API</a:t>
             </a:r>
             <a:endParaRPr lang="en-US" dirty="0"/>
@@ -3354,7 +3474,7 @@
 </p:sld>
 </file>
 
-<file path=ppt/slides/slide12.xml><?xml version="1.0" encoding="utf-8"?>
+<file path=ppt/slides/slide13.xml><?xml version="1.0" encoding="utf-8"?>
 <p:sld xmlns:a="http://schemas.openxmlformats.org/drawingml/2006/main" xmlns:r="http://schemas.openxmlformats.org/officeDocument/2006/relationships" xmlns:p="http://schemas.openxmlformats.org/presentationml/2006/main">
   <p:cSld>
     <p:spTree>
@@ -4443,7 +4563,6 @@
               <a:rPr lang="en-US" b="1" dirty="0" smtClean="0"/>
               <a:t>Daemon</a:t>
             </a:r>
-            <a:endParaRPr lang="en-US" b="1" dirty="0" smtClean="0"/>
           </a:p>
         </p:txBody>
       </p:sp>
@@ -4494,7 +4613,6 @@
               <a:rPr lang="en-US" b="1" dirty="0" smtClean="0"/>
               <a:t>Daemon</a:t>
             </a:r>
-            <a:endParaRPr lang="en-US" b="1" dirty="0" smtClean="0"/>
           </a:p>
         </p:txBody>
       </p:sp>
@@ -5270,7 +5388,6 @@
               <a:rPr lang="en-US" b="1" dirty="0" smtClean="0"/>
               <a:t>Daemon</a:t>
             </a:r>
-            <a:endParaRPr lang="en-US" b="1" dirty="0" smtClean="0"/>
           </a:p>
         </p:txBody>
       </p:sp>
@@ -5675,7 +5792,6 @@
               <a:rPr lang="en-US" b="1" dirty="0" smtClean="0"/>
               <a:t>Daemon</a:t>
             </a:r>
-            <a:endParaRPr lang="en-US" b="1" dirty="0" smtClean="0"/>
           </a:p>
         </p:txBody>
       </p:sp>
@@ -6206,9 +6322,197 @@
         </p:nvSpPr>
         <p:spPr/>
         <p:txBody>
-          <a:bodyPr/>
-          <a:lstStyle/>
-          <a:p>
+          <a:bodyPr>
+            <a:normAutofit fontScale="90000"/>
+          </a:bodyPr>
+          <a:lstStyle/>
+          <a:p>
+            <a:r>
+              <a:rPr lang="en-US" dirty="0" smtClean="0"/>
+              <a:t>Training Daemon Module Interaction</a:t>
+            </a:r>
+            <a:endParaRPr lang="en-US" dirty="0"/>
+          </a:p>
+        </p:txBody>
+      </p:sp>
+      <p:sp>
+        <p:nvSpPr>
+          <p:cNvPr id="4" name="Rounded Rectangle 3"/>
+          <p:cNvSpPr/>
+          <p:nvPr/>
+        </p:nvSpPr>
+        <p:spPr>
+          <a:xfrm>
+            <a:off x="5763415" y="2014645"/>
+            <a:ext cx="1870364" cy="914400"/>
+          </a:xfrm>
+          <a:prstGeom prst="roundRect">
+            <a:avLst/>
+          </a:prstGeom>
+        </p:spPr>
+        <p:style>
+          <a:lnRef idx="1">
+            <a:schemeClr val="accent1"/>
+          </a:lnRef>
+          <a:fillRef idx="3">
+            <a:schemeClr val="accent1"/>
+          </a:fillRef>
+          <a:effectRef idx="2">
+            <a:schemeClr val="accent1"/>
+          </a:effectRef>
+          <a:fontRef idx="minor">
+            <a:schemeClr val="lt1"/>
+          </a:fontRef>
+        </p:style>
+        <p:txBody>
+          <a:bodyPr rtlCol="0" anchor="ctr"/>
+          <a:lstStyle/>
+          <a:p>
+            <a:pPr algn="ctr"/>
+            <a:r>
+              <a:rPr lang="en-US" dirty="0" smtClean="0"/>
+              <a:t>D2V Lib</a:t>
+            </a:r>
+            <a:endParaRPr lang="en-US" dirty="0"/>
+          </a:p>
+        </p:txBody>
+      </p:sp>
+      <p:sp>
+        <p:nvSpPr>
+          <p:cNvPr id="5" name="Rounded Rectangle 4"/>
+          <p:cNvSpPr/>
+          <p:nvPr/>
+        </p:nvSpPr>
+        <p:spPr>
+          <a:xfrm>
+            <a:off x="4541455" y="5474722"/>
+            <a:ext cx="1274844" cy="850904"/>
+          </a:xfrm>
+          <a:prstGeom prst="roundRect">
+            <a:avLst>
+              <a:gd name="adj" fmla="val 5041"/>
+            </a:avLst>
+          </a:prstGeom>
+        </p:spPr>
+        <p:style>
+          <a:lnRef idx="1">
+            <a:schemeClr val="accent5"/>
+          </a:lnRef>
+          <a:fillRef idx="2">
+            <a:schemeClr val="accent5"/>
+          </a:fillRef>
+          <a:effectRef idx="1">
+            <a:schemeClr val="accent5"/>
+          </a:effectRef>
+          <a:fontRef idx="minor">
+            <a:schemeClr val="dk1"/>
+          </a:fontRef>
+        </p:style>
+        <p:txBody>
+          <a:bodyPr rtlCol="0" anchor="ctr"/>
+          <a:lstStyle/>
+          <a:p>
+            <a:pPr algn="ctr"/>
+            <a:r>
+              <a:rPr lang="en-US" dirty="0" smtClean="0"/>
+              <a:t>PDVL</a:t>
+            </a:r>
+          </a:p>
+          <a:p>
+            <a:pPr algn="ctr"/>
+            <a:r>
+              <a:rPr lang="en-US" dirty="0" smtClean="0"/>
+              <a:t>File</a:t>
+            </a:r>
+            <a:endParaRPr lang="en-US" dirty="0"/>
+          </a:p>
+        </p:txBody>
+      </p:sp>
+      <p:sp>
+        <p:nvSpPr>
+          <p:cNvPr id="6" name="Rounded Rectangle 5"/>
+          <p:cNvSpPr/>
+          <p:nvPr/>
+        </p:nvSpPr>
+        <p:spPr>
+          <a:xfrm>
+            <a:off x="6892636" y="5439127"/>
+            <a:ext cx="1220280" cy="886499"/>
+          </a:xfrm>
+          <a:prstGeom prst="roundRect">
+            <a:avLst>
+              <a:gd name="adj" fmla="val 5041"/>
+            </a:avLst>
+          </a:prstGeom>
+        </p:spPr>
+        <p:style>
+          <a:lnRef idx="1">
+            <a:schemeClr val="dk1"/>
+          </a:lnRef>
+          <a:fillRef idx="2">
+            <a:schemeClr val="dk1"/>
+          </a:fillRef>
+          <a:effectRef idx="1">
+            <a:schemeClr val="dk1"/>
+          </a:effectRef>
+          <a:fontRef idx="minor">
+            <a:schemeClr val="dk1"/>
+          </a:fontRef>
+        </p:style>
+        <p:txBody>
+          <a:bodyPr rtlCol="0" anchor="ctr"/>
+          <a:lstStyle/>
+          <a:p>
+            <a:pPr algn="ctr"/>
+            <a:r>
+              <a:rPr lang="en-US" dirty="0" smtClean="0"/>
+              <a:t>GTT</a:t>
+            </a:r>
+          </a:p>
+          <a:p>
+            <a:pPr algn="ctr"/>
+            <a:r>
+              <a:rPr lang="en-US" dirty="0" smtClean="0"/>
+              <a:t>File</a:t>
+            </a:r>
+            <a:endParaRPr lang="en-US" dirty="0"/>
+          </a:p>
+        </p:txBody>
+      </p:sp>
+      <p:sp>
+        <p:nvSpPr>
+          <p:cNvPr id="9" name="Rounded Rectangle 8"/>
+          <p:cNvSpPr/>
+          <p:nvPr/>
+        </p:nvSpPr>
+        <p:spPr>
+          <a:xfrm>
+            <a:off x="939649" y="2014646"/>
+            <a:ext cx="1870364" cy="914400"/>
+          </a:xfrm>
+          <a:prstGeom prst="roundRect">
+            <a:avLst/>
+          </a:prstGeom>
+        </p:spPr>
+        <p:style>
+          <a:lnRef idx="1">
+            <a:schemeClr val="accent1"/>
+          </a:lnRef>
+          <a:fillRef idx="3">
+            <a:schemeClr val="accent1"/>
+          </a:fillRef>
+          <a:effectRef idx="2">
+            <a:schemeClr val="accent1"/>
+          </a:effectRef>
+          <a:fontRef idx="minor">
+            <a:schemeClr val="lt1"/>
+          </a:fontRef>
+        </p:style>
+        <p:txBody>
+          <a:bodyPr rtlCol="0" anchor="ctr"/>
+          <a:lstStyle/>
+          <a:p>
+            <a:pPr algn="ctr"/>
             <a:r>
               <a:rPr lang="en-US" dirty="0" smtClean="0"/>
               <a:t>Trainer Daemon</a:t>
@@ -6219,57 +6523,667 @@
       </p:sp>
       <p:sp>
         <p:nvSpPr>
-          <p:cNvPr id="3" name="Content Placeholder 2"/>
-          <p:cNvSpPr>
-            <a:spLocks noGrp="1"/>
-          </p:cNvSpPr>
-          <p:nvPr>
-            <p:ph idx="1"/>
-          </p:nvPr>
-        </p:nvSpPr>
-        <p:spPr/>
-        <p:txBody>
-          <a:bodyPr>
-            <a:normAutofit lnSpcReduction="10000"/>
+          <p:cNvPr id="10" name="Rounded Rectangle 9"/>
+          <p:cNvSpPr/>
+          <p:nvPr/>
+        </p:nvSpPr>
+        <p:spPr>
+          <a:xfrm>
+            <a:off x="7004552" y="4035955"/>
+            <a:ext cx="1108364" cy="914400"/>
+          </a:xfrm>
+          <a:prstGeom prst="roundRect">
+            <a:avLst/>
+          </a:prstGeom>
+        </p:spPr>
+        <p:style>
+          <a:lnRef idx="1">
+            <a:schemeClr val="accent1"/>
+          </a:lnRef>
+          <a:fillRef idx="3">
+            <a:schemeClr val="accent1"/>
+          </a:fillRef>
+          <a:effectRef idx="2">
+            <a:schemeClr val="accent1"/>
+          </a:effectRef>
+          <a:fontRef idx="minor">
+            <a:schemeClr val="lt1"/>
+          </a:fontRef>
+        </p:style>
+        <p:txBody>
+          <a:bodyPr rtlCol="0" anchor="ctr"/>
+          <a:lstStyle/>
+          <a:p>
+            <a:pPr algn="ctr"/>
+            <a:r>
+              <a:rPr lang="en-US" dirty="0" smtClean="0"/>
+              <a:t>GTT Lib</a:t>
+            </a:r>
+            <a:endParaRPr lang="en-US" dirty="0"/>
+          </a:p>
+        </p:txBody>
+      </p:sp>
+      <p:sp>
+        <p:nvSpPr>
+          <p:cNvPr id="11" name="Rounded Rectangle 10"/>
+          <p:cNvSpPr/>
+          <p:nvPr/>
+        </p:nvSpPr>
+        <p:spPr>
+          <a:xfrm>
+            <a:off x="4525441" y="4035955"/>
+            <a:ext cx="1274844" cy="914400"/>
+          </a:xfrm>
+          <a:prstGeom prst="roundRect">
+            <a:avLst/>
+          </a:prstGeom>
+        </p:spPr>
+        <p:style>
+          <a:lnRef idx="1">
+            <a:schemeClr val="accent1"/>
+          </a:lnRef>
+          <a:fillRef idx="3">
+            <a:schemeClr val="accent1"/>
+          </a:fillRef>
+          <a:effectRef idx="2">
+            <a:schemeClr val="accent1"/>
+          </a:effectRef>
+          <a:fontRef idx="minor">
+            <a:schemeClr val="lt1"/>
+          </a:fontRef>
+        </p:style>
+        <p:txBody>
+          <a:bodyPr rtlCol="0" anchor="ctr"/>
+          <a:lstStyle/>
+          <a:p>
+            <a:pPr algn="ctr"/>
+            <a:r>
+              <a:rPr lang="en-US" dirty="0" smtClean="0"/>
+              <a:t>PDVL Lib</a:t>
+            </a:r>
+            <a:endParaRPr lang="en-US" dirty="0"/>
+          </a:p>
+        </p:txBody>
+      </p:sp>
+      <p:cxnSp>
+        <p:nvCxnSpPr>
+          <p:cNvPr id="13" name="Elbow Connector 12"/>
+          <p:cNvCxnSpPr>
+            <a:stCxn id="9" idx="3"/>
+            <a:endCxn id="4" idx="1"/>
+          </p:cNvCxnSpPr>
+          <p:nvPr/>
+        </p:nvCxnSpPr>
+        <p:spPr>
+          <a:xfrm flipV="1">
+            <a:off x="2810013" y="2471845"/>
+            <a:ext cx="2953402" cy="1"/>
+          </a:xfrm>
+          <a:prstGeom prst="bentConnector3">
+            <a:avLst>
+              <a:gd name="adj1" fmla="val 50000"/>
+            </a:avLst>
+          </a:prstGeom>
+          <a:ln>
+            <a:tailEnd type="arrow"/>
+          </a:ln>
+        </p:spPr>
+        <p:style>
+          <a:lnRef idx="2">
+            <a:schemeClr val="accent1"/>
+          </a:lnRef>
+          <a:fillRef idx="0">
+            <a:schemeClr val="accent1"/>
+          </a:fillRef>
+          <a:effectRef idx="1">
+            <a:schemeClr val="accent1"/>
+          </a:effectRef>
+          <a:fontRef idx="minor">
+            <a:schemeClr val="tx1"/>
+          </a:fontRef>
+        </p:style>
+      </p:cxnSp>
+      <p:sp>
+        <p:nvSpPr>
+          <p:cNvPr id="14" name="Folded Corner 13"/>
+          <p:cNvSpPr/>
+          <p:nvPr/>
+        </p:nvSpPr>
+        <p:spPr>
+          <a:xfrm>
+            <a:off x="4021131" y="2178143"/>
+            <a:ext cx="643233" cy="413775"/>
+          </a:xfrm>
+          <a:prstGeom prst="foldedCorner">
+            <a:avLst/>
+          </a:prstGeom>
+        </p:spPr>
+        <p:style>
+          <a:lnRef idx="2">
+            <a:schemeClr val="accent1"/>
+          </a:lnRef>
+          <a:fillRef idx="1">
+            <a:schemeClr val="lt1"/>
+          </a:fillRef>
+          <a:effectRef idx="0">
+            <a:schemeClr val="accent1"/>
+          </a:effectRef>
+          <a:fontRef idx="minor">
+            <a:schemeClr val="dk1"/>
+          </a:fontRef>
+        </p:style>
+        <p:txBody>
+          <a:bodyPr rtlCol="0" anchor="ctr"/>
+          <a:lstStyle/>
+          <a:p>
+            <a:r>
+              <a:rPr lang="en-US" dirty="0" smtClean="0"/>
+              <a:t>Doc.</a:t>
+            </a:r>
+            <a:endParaRPr lang="en-US" dirty="0" smtClean="0"/>
+          </a:p>
+        </p:txBody>
+      </p:sp>
+      <p:cxnSp>
+        <p:nvCxnSpPr>
+          <p:cNvPr id="16" name="Elbow Connector 15"/>
+          <p:cNvCxnSpPr>
+            <a:stCxn id="4" idx="2"/>
+          </p:cNvCxnSpPr>
+          <p:nvPr/>
+        </p:nvCxnSpPr>
+        <p:spPr>
+          <a:xfrm rot="5400000" flipH="1">
+            <a:off x="4640004" y="870453"/>
+            <a:ext cx="228601" cy="3888584"/>
+          </a:xfrm>
+          <a:prstGeom prst="bentConnector4">
+            <a:avLst>
+              <a:gd name="adj1" fmla="val -100000"/>
+              <a:gd name="adj2" fmla="val 62025"/>
+            </a:avLst>
+          </a:prstGeom>
+          <a:ln>
+            <a:tailEnd type="arrow"/>
+          </a:ln>
+        </p:spPr>
+        <p:style>
+          <a:lnRef idx="2">
+            <a:schemeClr val="accent1"/>
+          </a:lnRef>
+          <a:fillRef idx="0">
+            <a:schemeClr val="accent1"/>
+          </a:fillRef>
+          <a:effectRef idx="1">
+            <a:schemeClr val="accent1"/>
+          </a:effectRef>
+          <a:fontRef idx="minor">
+            <a:schemeClr val="tx1"/>
+          </a:fontRef>
+        </p:style>
+      </p:cxnSp>
+      <p:cxnSp>
+        <p:nvCxnSpPr>
+          <p:cNvPr id="19" name="Elbow Connector 18"/>
+          <p:cNvCxnSpPr>
+            <a:stCxn id="4" idx="3"/>
+            <a:endCxn id="10" idx="1"/>
+          </p:cNvCxnSpPr>
+          <p:nvPr/>
+        </p:nvCxnSpPr>
+        <p:spPr>
+          <a:xfrm flipH="1">
+            <a:off x="7004552" y="2471845"/>
+            <a:ext cx="629227" cy="2021310"/>
+          </a:xfrm>
+          <a:prstGeom prst="bentConnector5">
+            <a:avLst>
+              <a:gd name="adj1" fmla="val -36330"/>
+              <a:gd name="adj2" fmla="val 50000"/>
+              <a:gd name="adj3" fmla="val 136330"/>
+            </a:avLst>
+          </a:prstGeom>
+          <a:ln>
+            <a:headEnd type="arrow"/>
+            <a:tailEnd type="arrow"/>
+          </a:ln>
+        </p:spPr>
+        <p:style>
+          <a:lnRef idx="2">
+            <a:schemeClr val="accent1"/>
+          </a:lnRef>
+          <a:fillRef idx="0">
+            <a:schemeClr val="accent1"/>
+          </a:fillRef>
+          <a:effectRef idx="1">
+            <a:schemeClr val="accent1"/>
+          </a:effectRef>
+          <a:fontRef idx="minor">
+            <a:schemeClr val="tx1"/>
+          </a:fontRef>
+        </p:style>
+      </p:cxnSp>
+      <p:sp>
+        <p:nvSpPr>
+          <p:cNvPr id="20" name="Up-Down Arrow 19"/>
+          <p:cNvSpPr/>
+          <p:nvPr/>
+        </p:nvSpPr>
+        <p:spPr>
+          <a:xfrm>
+            <a:off x="7720371" y="4726464"/>
+            <a:ext cx="392545" cy="844520"/>
+          </a:xfrm>
+          <a:prstGeom prst="upDownArrow">
+            <a:avLst/>
+          </a:prstGeom>
+        </p:spPr>
+        <p:style>
+          <a:lnRef idx="1">
+            <a:schemeClr val="accent1"/>
+          </a:lnRef>
+          <a:fillRef idx="3">
+            <a:schemeClr val="accent1"/>
+          </a:fillRef>
+          <a:effectRef idx="2">
+            <a:schemeClr val="accent1"/>
+          </a:effectRef>
+          <a:fontRef idx="minor">
+            <a:schemeClr val="lt1"/>
+          </a:fontRef>
+        </p:style>
+        <p:txBody>
+          <a:bodyPr rtlCol="0" anchor="ctr"/>
+          <a:lstStyle/>
+          <a:p>
+            <a:pPr algn="ctr"/>
+            <a:endParaRPr lang="en-US"/>
+          </a:p>
+        </p:txBody>
+      </p:sp>
+      <p:sp>
+        <p:nvSpPr>
+          <p:cNvPr id="21" name="Up-Down Arrow 20"/>
+          <p:cNvSpPr/>
+          <p:nvPr/>
+        </p:nvSpPr>
+        <p:spPr>
+          <a:xfrm>
+            <a:off x="5268117" y="4838426"/>
+            <a:ext cx="336272" cy="790700"/>
+          </a:xfrm>
+          <a:prstGeom prst="upDownArrow">
+            <a:avLst/>
+          </a:prstGeom>
+        </p:spPr>
+        <p:style>
+          <a:lnRef idx="1">
+            <a:schemeClr val="accent1"/>
+          </a:lnRef>
+          <a:fillRef idx="3">
+            <a:schemeClr val="accent1"/>
+          </a:fillRef>
+          <a:effectRef idx="2">
+            <a:schemeClr val="accent1"/>
+          </a:effectRef>
+          <a:fontRef idx="minor">
+            <a:schemeClr val="lt1"/>
+          </a:fontRef>
+        </p:style>
+        <p:txBody>
+          <a:bodyPr rtlCol="0" anchor="ctr"/>
+          <a:lstStyle/>
+          <a:p>
+            <a:pPr algn="ctr"/>
+            <a:endParaRPr lang="en-US"/>
+          </a:p>
+        </p:txBody>
+      </p:sp>
+      <p:cxnSp>
+        <p:nvCxnSpPr>
+          <p:cNvPr id="23" name="Elbow Connector 22"/>
+          <p:cNvCxnSpPr>
+            <a:stCxn id="9" idx="2"/>
+            <a:endCxn id="11" idx="1"/>
+          </p:cNvCxnSpPr>
+          <p:nvPr/>
+        </p:nvCxnSpPr>
+        <p:spPr>
+          <a:xfrm rot="16200000" flipH="1">
+            <a:off x="2418082" y="2385795"/>
+            <a:ext cx="1564109" cy="2650610"/>
+          </a:xfrm>
+          <a:prstGeom prst="bentConnector2">
+            <a:avLst/>
+          </a:prstGeom>
+          <a:ln>
+            <a:tailEnd type="arrow"/>
+          </a:ln>
+        </p:spPr>
+        <p:style>
+          <a:lnRef idx="2">
+            <a:schemeClr val="accent1"/>
+          </a:lnRef>
+          <a:fillRef idx="0">
+            <a:schemeClr val="accent1"/>
+          </a:fillRef>
+          <a:effectRef idx="1">
+            <a:schemeClr val="accent1"/>
+          </a:effectRef>
+          <a:fontRef idx="minor">
+            <a:schemeClr val="tx1"/>
+          </a:fontRef>
+        </p:style>
+      </p:cxnSp>
+      <p:sp>
+        <p:nvSpPr>
+          <p:cNvPr id="31" name="Folded Corner 30"/>
+          <p:cNvSpPr/>
+          <p:nvPr/>
+        </p:nvSpPr>
+        <p:spPr>
+          <a:xfrm>
+            <a:off x="4021131" y="2958092"/>
+            <a:ext cx="643233" cy="413775"/>
+          </a:xfrm>
+          <a:prstGeom prst="foldedCorner">
+            <a:avLst/>
+          </a:prstGeom>
+        </p:spPr>
+        <p:style>
+          <a:lnRef idx="2">
+            <a:schemeClr val="accent2"/>
+          </a:lnRef>
+          <a:fillRef idx="1">
+            <a:schemeClr val="lt1"/>
+          </a:fillRef>
+          <a:effectRef idx="0">
+            <a:schemeClr val="accent2"/>
+          </a:effectRef>
+          <a:fontRef idx="minor">
+            <a:schemeClr val="dk1"/>
+          </a:fontRef>
+        </p:style>
+        <p:txBody>
+          <a:bodyPr rtlCol="0" anchor="ctr"/>
+          <a:lstStyle/>
+          <a:p>
+            <a:r>
+              <a:rPr lang="en-US" dirty="0" smtClean="0"/>
+              <a:t>DV</a:t>
+            </a:r>
+            <a:endParaRPr lang="en-US" dirty="0" smtClean="0"/>
+          </a:p>
+        </p:txBody>
+      </p:sp>
+      <p:sp>
+        <p:nvSpPr>
+          <p:cNvPr id="32" name="Folded Corner 31"/>
+          <p:cNvSpPr/>
+          <p:nvPr/>
+        </p:nvSpPr>
+        <p:spPr>
+          <a:xfrm>
+            <a:off x="2580760" y="4358053"/>
+            <a:ext cx="643233" cy="413775"/>
+          </a:xfrm>
+          <a:prstGeom prst="foldedCorner">
+            <a:avLst/>
+          </a:prstGeom>
+        </p:spPr>
+        <p:style>
+          <a:lnRef idx="2">
+            <a:schemeClr val="accent2"/>
+          </a:lnRef>
+          <a:fillRef idx="1">
+            <a:schemeClr val="lt1"/>
+          </a:fillRef>
+          <a:effectRef idx="0">
+            <a:schemeClr val="accent2"/>
+          </a:effectRef>
+          <a:fontRef idx="minor">
+            <a:schemeClr val="dk1"/>
+          </a:fontRef>
+        </p:style>
+        <p:txBody>
+          <a:bodyPr rtlCol="0" anchor="ctr"/>
+          <a:lstStyle/>
+          <a:p>
+            <a:r>
+              <a:rPr lang="en-US" dirty="0" smtClean="0"/>
+              <a:t>DV</a:t>
+            </a:r>
+            <a:endParaRPr lang="en-US" dirty="0" smtClean="0"/>
+          </a:p>
+        </p:txBody>
+      </p:sp>
+      <p:sp>
+        <p:nvSpPr>
+          <p:cNvPr id="52" name="Oval 51"/>
+          <p:cNvSpPr/>
+          <p:nvPr/>
+        </p:nvSpPr>
+        <p:spPr>
+          <a:xfrm>
+            <a:off x="3507507" y="2116916"/>
+            <a:ext cx="457199" cy="457199"/>
+          </a:xfrm>
+          <a:prstGeom prst="ellipse">
+            <a:avLst/>
+          </a:prstGeom>
+          <a:ln w="12700" cmpd="sng">
+            <a:solidFill>
+              <a:srgbClr val="4F81BD"/>
+            </a:solidFill>
+            <a:prstDash val="sysDash"/>
+          </a:ln>
+        </p:spPr>
+        <p:style>
+          <a:lnRef idx="2">
+            <a:schemeClr val="dk1"/>
+          </a:lnRef>
+          <a:fillRef idx="1">
+            <a:schemeClr val="lt1"/>
+          </a:fillRef>
+          <a:effectRef idx="0">
+            <a:schemeClr val="dk1"/>
+          </a:effectRef>
+          <a:fontRef idx="minor">
+            <a:schemeClr val="dk1"/>
+          </a:fontRef>
+        </p:style>
+        <p:txBody>
+          <a:bodyPr rtlCol="0" anchor="ctr"/>
+          <a:lstStyle/>
+          <a:p>
+            <a:pPr algn="ctr"/>
+            <a:r>
+              <a:rPr lang="en-US" dirty="0" smtClean="0"/>
+              <a:t>1</a:t>
+            </a:r>
+            <a:endParaRPr lang="en-US" dirty="0"/>
+          </a:p>
+        </p:txBody>
+      </p:sp>
+      <p:sp>
+        <p:nvSpPr>
+          <p:cNvPr id="53" name="Oval 52"/>
+          <p:cNvSpPr/>
+          <p:nvPr/>
+        </p:nvSpPr>
+        <p:spPr>
+          <a:xfrm>
+            <a:off x="7720371" y="3143267"/>
+            <a:ext cx="457199" cy="457199"/>
+          </a:xfrm>
+          <a:prstGeom prst="ellipse">
+            <a:avLst/>
+          </a:prstGeom>
+          <a:ln w="12700" cmpd="sng">
+            <a:solidFill>
+              <a:srgbClr val="4F81BD"/>
+            </a:solidFill>
+            <a:prstDash val="sysDash"/>
+          </a:ln>
+        </p:spPr>
+        <p:style>
+          <a:lnRef idx="2">
+            <a:schemeClr val="dk1"/>
+          </a:lnRef>
+          <a:fillRef idx="1">
+            <a:schemeClr val="lt1"/>
+          </a:fillRef>
+          <a:effectRef idx="0">
+            <a:schemeClr val="dk1"/>
+          </a:effectRef>
+          <a:fontRef idx="minor">
+            <a:schemeClr val="dk1"/>
+          </a:fontRef>
+        </p:style>
+        <p:txBody>
+          <a:bodyPr rtlCol="0" anchor="ctr"/>
+          <a:lstStyle/>
+          <a:p>
+            <a:pPr algn="ctr"/>
+            <a:r>
+              <a:rPr lang="en-US" dirty="0" smtClean="0"/>
+              <a:t>2</a:t>
+            </a:r>
+            <a:endParaRPr lang="en-US" dirty="0"/>
+          </a:p>
+        </p:txBody>
+      </p:sp>
+      <p:sp>
+        <p:nvSpPr>
+          <p:cNvPr id="54" name="Folded Corner 53"/>
+          <p:cNvSpPr/>
+          <p:nvPr/>
+        </p:nvSpPr>
+        <p:spPr>
+          <a:xfrm>
+            <a:off x="7004552" y="3208403"/>
+            <a:ext cx="643233" cy="413775"/>
+          </a:xfrm>
+          <a:prstGeom prst="foldedCorner">
+            <a:avLst/>
+          </a:prstGeom>
+        </p:spPr>
+        <p:style>
+          <a:lnRef idx="2">
+            <a:schemeClr val="dk1"/>
+          </a:lnRef>
+          <a:fillRef idx="1">
+            <a:schemeClr val="lt1"/>
+          </a:fillRef>
+          <a:effectRef idx="0">
+            <a:schemeClr val="dk1"/>
+          </a:effectRef>
+          <a:fontRef idx="minor">
+            <a:schemeClr val="dk1"/>
+          </a:fontRef>
+        </p:style>
+        <p:txBody>
+          <a:bodyPr rtlCol="0" anchor="ctr"/>
+          <a:lstStyle/>
+          <a:p>
+            <a:r>
+              <a:rPr lang="en-US" sz="1400" dirty="0" smtClean="0"/>
+              <a:t>Terms</a:t>
+            </a:r>
+            <a:endParaRPr lang="en-US" sz="1400" dirty="0" smtClean="0"/>
+          </a:p>
+        </p:txBody>
+      </p:sp>
+      <p:sp>
+        <p:nvSpPr>
+          <p:cNvPr id="58" name="Oval 57"/>
+          <p:cNvSpPr/>
+          <p:nvPr/>
+        </p:nvSpPr>
+        <p:spPr>
+          <a:xfrm>
+            <a:off x="2013376" y="4350063"/>
+            <a:ext cx="457199" cy="457199"/>
+          </a:xfrm>
+          <a:prstGeom prst="ellipse">
+            <a:avLst/>
+          </a:prstGeom>
+          <a:ln w="12700" cmpd="sng">
+            <a:solidFill>
+              <a:srgbClr val="4F81BD"/>
+            </a:solidFill>
+            <a:prstDash val="sysDash"/>
+          </a:ln>
+        </p:spPr>
+        <p:style>
+          <a:lnRef idx="2">
+            <a:schemeClr val="dk1"/>
+          </a:lnRef>
+          <a:fillRef idx="1">
+            <a:schemeClr val="lt1"/>
+          </a:fillRef>
+          <a:effectRef idx="0">
+            <a:schemeClr val="dk1"/>
+          </a:effectRef>
+          <a:fontRef idx="minor">
+            <a:schemeClr val="dk1"/>
+          </a:fontRef>
+        </p:style>
+        <p:txBody>
+          <a:bodyPr rtlCol="0" anchor="ctr"/>
+          <a:lstStyle/>
+          <a:p>
+            <a:pPr algn="ctr"/>
+            <a:r>
+              <a:rPr lang="en-US" dirty="0" smtClean="0"/>
+              <a:t>3</a:t>
+            </a:r>
+            <a:endParaRPr lang="en-US" dirty="0"/>
+          </a:p>
+        </p:txBody>
+      </p:sp>
+      <p:sp>
+        <p:nvSpPr>
+          <p:cNvPr id="60" name="TextBox 59"/>
+          <p:cNvSpPr txBox="1"/>
+          <p:nvPr/>
+        </p:nvSpPr>
+        <p:spPr>
+          <a:xfrm>
+            <a:off x="582071" y="5640549"/>
+            <a:ext cx="3869995" cy="400110"/>
+          </a:xfrm>
+          <a:prstGeom prst="rect">
+            <a:avLst/>
+          </a:prstGeom>
+          <a:noFill/>
+        </p:spPr>
+        <p:txBody>
+          <a:bodyPr wrap="none" rtlCol="0">
+            <a:spAutoFit/>
           </a:bodyPr>
           <a:lstStyle/>
           <a:p>
             <a:r>
-              <a:rPr lang="en-US" dirty="0" smtClean="0"/>
-              <a:t>Responsible for Coordinating Multiple Input Documents (Only User Liked)</a:t>
-            </a:r>
-          </a:p>
-          <a:p>
-            <a:r>
-              <a:rPr lang="en-US" dirty="0" smtClean="0"/>
-              <a:t>Controls D2V Module to Generate Document Vectors and Update PDVL (Personalized Document Vector List )</a:t>
-            </a:r>
-          </a:p>
-          <a:p>
-            <a:r>
-              <a:rPr lang="en-US" dirty="0" smtClean="0"/>
-              <a:t>D2V Internally Updates GTT</a:t>
-            </a:r>
-          </a:p>
-          <a:p>
-            <a:r>
-              <a:rPr lang="en-US" dirty="0" smtClean="0"/>
-              <a:t>Document Vectors are Merged to PDVL</a:t>
-            </a:r>
-          </a:p>
-          <a:p>
-            <a:r>
-              <a:rPr lang="en-US" dirty="0" smtClean="0"/>
-              <a:t>Output is PDVL (Shared with Evaluation Daemon)</a:t>
-            </a:r>
-            <a:endParaRPr lang="en-US" dirty="0"/>
+              <a:rPr lang="en-US" i="1" dirty="0" smtClean="0"/>
+              <a:t>* Trainer </a:t>
+            </a:r>
+            <a:r>
+              <a:rPr lang="en-US" sz="2000" i="1" dirty="0" smtClean="0"/>
+              <a:t>Daemon</a:t>
+            </a:r>
+            <a:r>
+              <a:rPr lang="en-US" i="1" dirty="0" smtClean="0"/>
+              <a:t> calls D2V and PDVL</a:t>
+            </a:r>
+            <a:endParaRPr lang="en-US" i="1" dirty="0"/>
           </a:p>
         </p:txBody>
       </p:sp>
     </p:spTree>
     <p:extLst>
       <p:ext uri="{BB962C8B-B14F-4D97-AF65-F5344CB8AC3E}">
-        <p14:creationId xmlns:p14="http://schemas.microsoft.com/office/powerpoint/2010/main" val="157436180"/>
+        <p14:creationId xmlns:p14="http://schemas.microsoft.com/office/powerpoint/2010/main" val="3875543101"/>
       </p:ext>
     </p:extLst>
   </p:cSld>
@@ -6313,7 +7227,7 @@
           <a:p>
             <a:r>
               <a:rPr lang="en-US" dirty="0" smtClean="0"/>
-              <a:t>Evaluation Daemon Design</a:t>
+              <a:t>Trainer Daemon</a:t>
             </a:r>
             <a:endParaRPr lang="en-US" dirty="0"/>
           </a:p>
@@ -6321,844 +7235,57 @@
       </p:sp>
       <p:sp>
         <p:nvSpPr>
-          <p:cNvPr id="6" name="Folded Corner 5"/>
-          <p:cNvSpPr/>
-          <p:nvPr/>
-        </p:nvSpPr>
-        <p:spPr>
-          <a:xfrm>
-            <a:off x="784944" y="2338139"/>
-            <a:ext cx="1502065" cy="802151"/>
-          </a:xfrm>
-          <a:prstGeom prst="foldedCorner">
-            <a:avLst/>
-          </a:prstGeom>
-        </p:spPr>
-        <p:style>
-          <a:lnRef idx="2">
-            <a:schemeClr val="accent1"/>
-          </a:lnRef>
-          <a:fillRef idx="1">
-            <a:schemeClr val="lt1"/>
-          </a:fillRef>
-          <a:effectRef idx="0">
-            <a:schemeClr val="accent1"/>
-          </a:effectRef>
-          <a:fontRef idx="minor">
-            <a:schemeClr val="dk1"/>
-          </a:fontRef>
-        </p:style>
-        <p:txBody>
-          <a:bodyPr rtlCol="0" anchor="ctr"/>
-          <a:lstStyle/>
-          <a:p>
+          <p:cNvPr id="3" name="Content Placeholder 2"/>
+          <p:cNvSpPr>
+            <a:spLocks noGrp="1"/>
+          </p:cNvSpPr>
+          <p:nvPr>
+            <p:ph idx="1"/>
+          </p:nvPr>
+        </p:nvSpPr>
+        <p:spPr/>
+        <p:txBody>
+          <a:bodyPr>
+            <a:normAutofit lnSpcReduction="10000"/>
+          </a:bodyPr>
+          <a:lstStyle/>
+          <a:p>
+            <a:r>
+              <a:rPr lang="en-US" dirty="0" smtClean="0"/>
+              <a:t>Responsible for Coordinating Multiple Input Documents (Only User Liked)</a:t>
+            </a:r>
+          </a:p>
+          <a:p>
+            <a:r>
+              <a:rPr lang="en-US" dirty="0" smtClean="0"/>
+              <a:t>Controls D2V Module to Generate Document Vectors and Update PDVL (Personalized Document Vector List )</a:t>
+            </a:r>
+          </a:p>
+          <a:p>
+            <a:r>
+              <a:rPr lang="en-US" dirty="0" smtClean="0"/>
+              <a:t>D2V Internally Updates GTT</a:t>
+            </a:r>
+          </a:p>
+          <a:p>
+            <a:r>
+              <a:rPr lang="en-US" dirty="0" smtClean="0"/>
+              <a:t>Document Vectors are Merged to PDVL</a:t>
+            </a:r>
+          </a:p>
+          <a:p>
+            <a:r>
+              <a:rPr lang="en-US" dirty="0" smtClean="0"/>
+              <a:t>Output is PDVL (Shared with Evaluation Daemon)</a:t>
+            </a:r>
             <a:endParaRPr lang="en-US" dirty="0"/>
           </a:p>
         </p:txBody>
       </p:sp>
-      <p:sp>
-        <p:nvSpPr>
-          <p:cNvPr id="7" name="Rounded Rectangle 6"/>
-          <p:cNvSpPr/>
-          <p:nvPr/>
-        </p:nvSpPr>
-        <p:spPr>
-          <a:xfrm>
-            <a:off x="2925468" y="1886526"/>
-            <a:ext cx="4570408" cy="2459182"/>
-          </a:xfrm>
-          <a:prstGeom prst="roundRect">
-            <a:avLst>
-              <a:gd name="adj" fmla="val 5041"/>
-            </a:avLst>
-          </a:prstGeom>
-        </p:spPr>
-        <p:style>
-          <a:lnRef idx="2">
-            <a:schemeClr val="accent1"/>
-          </a:lnRef>
-          <a:fillRef idx="1">
-            <a:schemeClr val="lt1"/>
-          </a:fillRef>
-          <a:effectRef idx="0">
-            <a:schemeClr val="accent1"/>
-          </a:effectRef>
-          <a:fontRef idx="minor">
-            <a:schemeClr val="dk1"/>
-          </a:fontRef>
-        </p:style>
-        <p:txBody>
-          <a:bodyPr rtlCol="0" anchor="t" anchorCtr="0"/>
-          <a:lstStyle/>
-          <a:p>
-            <a:r>
-              <a:rPr lang="en-US" b="1" dirty="0" smtClean="0"/>
-              <a:t>Evaluation</a:t>
-            </a:r>
-          </a:p>
-          <a:p>
-            <a:r>
-              <a:rPr lang="en-US" b="1" dirty="0" smtClean="0"/>
-              <a:t>Daemon</a:t>
-            </a:r>
-            <a:endParaRPr lang="en-US" b="1" dirty="0" smtClean="0"/>
-          </a:p>
-        </p:txBody>
-      </p:sp>
-      <p:sp>
-        <p:nvSpPr>
-          <p:cNvPr id="8" name="Rounded Rectangle 7"/>
-          <p:cNvSpPr/>
-          <p:nvPr/>
-        </p:nvSpPr>
-        <p:spPr>
-          <a:xfrm>
-            <a:off x="3096416" y="2938793"/>
-            <a:ext cx="1603515" cy="744621"/>
-          </a:xfrm>
-          <a:prstGeom prst="roundRect">
-            <a:avLst/>
-          </a:prstGeom>
-        </p:spPr>
-        <p:style>
-          <a:lnRef idx="1">
-            <a:schemeClr val="accent1"/>
-          </a:lnRef>
-          <a:fillRef idx="3">
-            <a:schemeClr val="accent1"/>
-          </a:fillRef>
-          <a:effectRef idx="2">
-            <a:schemeClr val="accent1"/>
-          </a:effectRef>
-          <a:fontRef idx="minor">
-            <a:schemeClr val="lt1"/>
-          </a:fontRef>
-        </p:style>
-        <p:txBody>
-          <a:bodyPr rtlCol="0" anchor="ctr"/>
-          <a:lstStyle/>
-          <a:p>
-            <a:pPr algn="ctr"/>
-            <a:r>
-              <a:rPr lang="en-US" dirty="0" smtClean="0"/>
-              <a:t>D2V</a:t>
-            </a:r>
-            <a:endParaRPr lang="en-US" dirty="0"/>
-          </a:p>
-        </p:txBody>
-      </p:sp>
-      <p:sp>
-        <p:nvSpPr>
-          <p:cNvPr id="9" name="Rounded Rectangle 8"/>
-          <p:cNvSpPr/>
-          <p:nvPr/>
-        </p:nvSpPr>
-        <p:spPr>
-          <a:xfrm>
-            <a:off x="4499746" y="4933753"/>
-            <a:ext cx="1747461" cy="1199191"/>
-          </a:xfrm>
-          <a:prstGeom prst="roundRect">
-            <a:avLst>
-              <a:gd name="adj" fmla="val 5041"/>
-            </a:avLst>
-          </a:prstGeom>
-        </p:spPr>
-        <p:style>
-          <a:lnRef idx="1">
-            <a:schemeClr val="accent5"/>
-          </a:lnRef>
-          <a:fillRef idx="2">
-            <a:schemeClr val="accent5"/>
-          </a:fillRef>
-          <a:effectRef idx="1">
-            <a:schemeClr val="accent5"/>
-          </a:effectRef>
-          <a:fontRef idx="minor">
-            <a:schemeClr val="dk1"/>
-          </a:fontRef>
-        </p:style>
-        <p:txBody>
-          <a:bodyPr rtlCol="0" anchor="ctr"/>
-          <a:lstStyle/>
-          <a:p>
-            <a:pPr algn="ctr"/>
-            <a:r>
-              <a:rPr lang="en-US" dirty="0" smtClean="0"/>
-              <a:t>PDVL</a:t>
-            </a:r>
-          </a:p>
-          <a:p>
-            <a:pPr algn="ctr"/>
-            <a:r>
-              <a:rPr lang="en-US" dirty="0" smtClean="0"/>
-              <a:t>(Personalized Document Vector List)</a:t>
-            </a:r>
-            <a:endParaRPr lang="en-US" dirty="0"/>
-          </a:p>
-        </p:txBody>
-      </p:sp>
-      <p:sp>
-        <p:nvSpPr>
-          <p:cNvPr id="10" name="Rounded Rectangle 9"/>
-          <p:cNvSpPr/>
-          <p:nvPr/>
-        </p:nvSpPr>
-        <p:spPr>
-          <a:xfrm>
-            <a:off x="2423928" y="5003799"/>
-            <a:ext cx="1806793" cy="1129145"/>
-          </a:xfrm>
-          <a:prstGeom prst="roundRect">
-            <a:avLst>
-              <a:gd name="adj" fmla="val 5041"/>
-            </a:avLst>
-          </a:prstGeom>
-        </p:spPr>
-        <p:style>
-          <a:lnRef idx="1">
-            <a:schemeClr val="dk1"/>
-          </a:lnRef>
-          <a:fillRef idx="2">
-            <a:schemeClr val="dk1"/>
-          </a:fillRef>
-          <a:effectRef idx="1">
-            <a:schemeClr val="dk1"/>
-          </a:effectRef>
-          <a:fontRef idx="minor">
-            <a:schemeClr val="dk1"/>
-          </a:fontRef>
-        </p:style>
-        <p:txBody>
-          <a:bodyPr rtlCol="0" anchor="ctr"/>
-          <a:lstStyle/>
-          <a:p>
-            <a:pPr algn="ctr"/>
-            <a:r>
-              <a:rPr lang="en-US" dirty="0" smtClean="0"/>
-              <a:t>GTT</a:t>
-            </a:r>
-          </a:p>
-          <a:p>
-            <a:pPr algn="ctr"/>
-            <a:r>
-              <a:rPr lang="en-US" dirty="0" smtClean="0"/>
-              <a:t>(Global Term ID Table)</a:t>
-            </a:r>
-            <a:endParaRPr lang="en-US" dirty="0"/>
-          </a:p>
-        </p:txBody>
-      </p:sp>
-      <p:sp>
-        <p:nvSpPr>
-          <p:cNvPr id="11" name="Folded Corner 10"/>
-          <p:cNvSpPr/>
-          <p:nvPr/>
-        </p:nvSpPr>
-        <p:spPr>
-          <a:xfrm>
-            <a:off x="684494" y="2221533"/>
-            <a:ext cx="1502065" cy="802151"/>
-          </a:xfrm>
-          <a:prstGeom prst="foldedCorner">
-            <a:avLst/>
-          </a:prstGeom>
-        </p:spPr>
-        <p:style>
-          <a:lnRef idx="2">
-            <a:schemeClr val="accent1"/>
-          </a:lnRef>
-          <a:fillRef idx="1">
-            <a:schemeClr val="lt1"/>
-          </a:fillRef>
-          <a:effectRef idx="0">
-            <a:schemeClr val="accent1"/>
-          </a:effectRef>
-          <a:fontRef idx="minor">
-            <a:schemeClr val="dk1"/>
-          </a:fontRef>
-        </p:style>
-        <p:txBody>
-          <a:bodyPr rtlCol="0" anchor="ctr"/>
-          <a:lstStyle/>
-          <a:p>
-            <a:pPr marL="285750" indent="-285750">
-              <a:buFont typeface="Arial"/>
-              <a:buChar char="•"/>
-            </a:pPr>
-            <a:r>
-              <a:rPr lang="en-US" dirty="0" smtClean="0"/>
-              <a:t>Plain Text</a:t>
-            </a:r>
-          </a:p>
-          <a:p>
-            <a:pPr marL="285750" indent="-285750">
-              <a:buFont typeface="Arial"/>
-              <a:buChar char="•"/>
-            </a:pPr>
-            <a:r>
-              <a:rPr lang="en-US" dirty="0" smtClean="0"/>
-              <a:t>User ID</a:t>
-            </a:r>
-            <a:endParaRPr lang="en-US" dirty="0"/>
-          </a:p>
-        </p:txBody>
-      </p:sp>
-      <p:cxnSp>
-        <p:nvCxnSpPr>
-          <p:cNvPr id="12" name="Elbow Connector 11"/>
-          <p:cNvCxnSpPr>
-            <a:stCxn id="11" idx="3"/>
-            <a:endCxn id="8" idx="1"/>
-          </p:cNvCxnSpPr>
-          <p:nvPr/>
-        </p:nvCxnSpPr>
-        <p:spPr>
-          <a:xfrm>
-            <a:off x="2186559" y="2622609"/>
-            <a:ext cx="909857" cy="688495"/>
-          </a:xfrm>
-          <a:prstGeom prst="bentConnector3">
-            <a:avLst/>
-          </a:prstGeom>
-          <a:ln>
-            <a:tailEnd type="arrow"/>
-          </a:ln>
-        </p:spPr>
-        <p:style>
-          <a:lnRef idx="2">
-            <a:schemeClr val="accent1"/>
-          </a:lnRef>
-          <a:fillRef idx="0">
-            <a:schemeClr val="accent1"/>
-          </a:fillRef>
-          <a:effectRef idx="1">
-            <a:schemeClr val="accent1"/>
-          </a:effectRef>
-          <a:fontRef idx="minor">
-            <a:schemeClr val="tx1"/>
-          </a:fontRef>
-        </p:style>
-      </p:cxnSp>
-      <p:cxnSp>
-        <p:nvCxnSpPr>
-          <p:cNvPr id="13" name="Elbow Connector 12"/>
-          <p:cNvCxnSpPr>
-            <a:stCxn id="10" idx="0"/>
-            <a:endCxn id="8" idx="2"/>
-          </p:cNvCxnSpPr>
-          <p:nvPr/>
-        </p:nvCxnSpPr>
-        <p:spPr>
-          <a:xfrm rot="5400000" flipH="1" flipV="1">
-            <a:off x="2952557" y="4058183"/>
-            <a:ext cx="1320385" cy="570849"/>
-          </a:xfrm>
-          <a:prstGeom prst="bentConnector3">
-            <a:avLst>
-              <a:gd name="adj1" fmla="val 50000"/>
-            </a:avLst>
-          </a:prstGeom>
-          <a:ln>
-            <a:prstDash val="dash"/>
-            <a:headEnd type="arrow"/>
-            <a:tailEnd type="arrow"/>
-          </a:ln>
-        </p:spPr>
-        <p:style>
-          <a:lnRef idx="2">
-            <a:schemeClr val="accent1"/>
-          </a:lnRef>
-          <a:fillRef idx="0">
-            <a:schemeClr val="accent1"/>
-          </a:fillRef>
-          <a:effectRef idx="1">
-            <a:schemeClr val="accent1"/>
-          </a:effectRef>
-          <a:fontRef idx="minor">
-            <a:schemeClr val="tx1"/>
-          </a:fontRef>
-        </p:style>
-      </p:cxnSp>
-      <p:sp>
-        <p:nvSpPr>
-          <p:cNvPr id="15" name="Rounded Rectangle 14"/>
-          <p:cNvSpPr/>
-          <p:nvPr/>
-        </p:nvSpPr>
-        <p:spPr>
-          <a:xfrm>
-            <a:off x="4499746" y="2101457"/>
-            <a:ext cx="1369438" cy="635000"/>
-          </a:xfrm>
-          <a:prstGeom prst="roundRect">
-            <a:avLst/>
-          </a:prstGeom>
-        </p:spPr>
-        <p:style>
-          <a:lnRef idx="1">
-            <a:schemeClr val="dk1"/>
-          </a:lnRef>
-          <a:fillRef idx="2">
-            <a:schemeClr val="dk1"/>
-          </a:fillRef>
-          <a:effectRef idx="1">
-            <a:schemeClr val="dk1"/>
-          </a:effectRef>
-          <a:fontRef idx="minor">
-            <a:schemeClr val="dk1"/>
-          </a:fontRef>
-        </p:style>
-        <p:txBody>
-          <a:bodyPr rtlCol="0" anchor="ctr"/>
-          <a:lstStyle/>
-          <a:p>
-            <a:pPr algn="ctr"/>
-            <a:r>
-              <a:rPr lang="en-US" dirty="0" smtClean="0"/>
-              <a:t>Document Vector</a:t>
-            </a:r>
-            <a:endParaRPr lang="en-US" dirty="0"/>
-          </a:p>
-        </p:txBody>
-      </p:sp>
-      <p:sp>
-        <p:nvSpPr>
-          <p:cNvPr id="17" name="Up Arrow Callout 16"/>
-          <p:cNvSpPr/>
-          <p:nvPr/>
-        </p:nvSpPr>
-        <p:spPr>
-          <a:xfrm>
-            <a:off x="784944" y="3391923"/>
-            <a:ext cx="1288470" cy="1611876"/>
-          </a:xfrm>
-          <a:prstGeom prst="upArrowCallout">
-            <a:avLst>
-              <a:gd name="adj1" fmla="val 21415"/>
-              <a:gd name="adj2" fmla="val 25000"/>
-              <a:gd name="adj3" fmla="val 19624"/>
-              <a:gd name="adj4" fmla="val 64977"/>
-            </a:avLst>
-          </a:prstGeom>
-        </p:spPr>
-        <p:style>
-          <a:lnRef idx="1">
-            <a:schemeClr val="dk1"/>
-          </a:lnRef>
-          <a:fillRef idx="2">
-            <a:schemeClr val="dk1"/>
-          </a:fillRef>
-          <a:effectRef idx="1">
-            <a:schemeClr val="dk1"/>
-          </a:effectRef>
-          <a:fontRef idx="minor">
-            <a:schemeClr val="dk1"/>
-          </a:fontRef>
-        </p:style>
-        <p:txBody>
-          <a:bodyPr rtlCol="0" anchor="ctr"/>
-          <a:lstStyle/>
-          <a:p>
-            <a:pPr algn="ctr"/>
-            <a:r>
-              <a:rPr lang="en-US" dirty="0" smtClean="0"/>
-              <a:t>News from Subscriptions</a:t>
-            </a:r>
-            <a:endParaRPr lang="en-US" dirty="0"/>
-          </a:p>
-        </p:txBody>
-      </p:sp>
-      <p:sp>
-        <p:nvSpPr>
-          <p:cNvPr id="18" name="Rounded Rectangle 17"/>
-          <p:cNvSpPr/>
-          <p:nvPr/>
-        </p:nvSpPr>
-        <p:spPr>
-          <a:xfrm>
-            <a:off x="4395837" y="2020639"/>
-            <a:ext cx="1369438" cy="635000"/>
-          </a:xfrm>
-          <a:prstGeom prst="roundRect">
-            <a:avLst/>
-          </a:prstGeom>
-        </p:spPr>
-        <p:style>
-          <a:lnRef idx="1">
-            <a:schemeClr val="accent2"/>
-          </a:lnRef>
-          <a:fillRef idx="2">
-            <a:schemeClr val="accent2"/>
-          </a:fillRef>
-          <a:effectRef idx="1">
-            <a:schemeClr val="accent2"/>
-          </a:effectRef>
-          <a:fontRef idx="minor">
-            <a:schemeClr val="dk1"/>
-          </a:fontRef>
-        </p:style>
-        <p:txBody>
-          <a:bodyPr rtlCol="0" anchor="ctr"/>
-          <a:lstStyle/>
-          <a:p>
-            <a:pPr algn="ctr"/>
-            <a:r>
-              <a:rPr lang="en-US" dirty="0" smtClean="0"/>
-              <a:t>Document Vector</a:t>
-            </a:r>
-            <a:endParaRPr lang="en-US" dirty="0"/>
-          </a:p>
-        </p:txBody>
-      </p:sp>
-      <p:sp>
-        <p:nvSpPr>
-          <p:cNvPr id="31" name="Rounded Rectangle 30"/>
-          <p:cNvSpPr/>
-          <p:nvPr/>
-        </p:nvSpPr>
-        <p:spPr>
-          <a:xfrm>
-            <a:off x="5722356" y="2984901"/>
-            <a:ext cx="1603515" cy="744621"/>
-          </a:xfrm>
-          <a:prstGeom prst="roundRect">
-            <a:avLst/>
-          </a:prstGeom>
-        </p:spPr>
-        <p:style>
-          <a:lnRef idx="1">
-            <a:schemeClr val="accent1"/>
-          </a:lnRef>
-          <a:fillRef idx="3">
-            <a:schemeClr val="accent1"/>
-          </a:fillRef>
-          <a:effectRef idx="2">
-            <a:schemeClr val="accent1"/>
-          </a:effectRef>
-          <a:fontRef idx="minor">
-            <a:schemeClr val="lt1"/>
-          </a:fontRef>
-        </p:style>
-        <p:txBody>
-          <a:bodyPr rtlCol="0" anchor="ctr"/>
-          <a:lstStyle/>
-          <a:p>
-            <a:pPr algn="ctr"/>
-            <a:r>
-              <a:rPr lang="en-US" dirty="0" smtClean="0"/>
-              <a:t>NVE</a:t>
-            </a:r>
-            <a:endParaRPr lang="en-US" dirty="0"/>
-          </a:p>
-        </p:txBody>
-      </p:sp>
-      <p:cxnSp>
-        <p:nvCxnSpPr>
-          <p:cNvPr id="35" name="Elbow Connector 34"/>
-          <p:cNvCxnSpPr>
-            <a:stCxn id="9" idx="0"/>
-            <a:endCxn id="31" idx="2"/>
-          </p:cNvCxnSpPr>
-          <p:nvPr/>
-        </p:nvCxnSpPr>
-        <p:spPr>
-          <a:xfrm rot="5400000" flipH="1" flipV="1">
-            <a:off x="5346680" y="3756320"/>
-            <a:ext cx="1204231" cy="1150637"/>
-          </a:xfrm>
-          <a:prstGeom prst="bentConnector3">
-            <a:avLst/>
-          </a:prstGeom>
-          <a:ln>
-            <a:tailEnd type="arrow"/>
-          </a:ln>
-        </p:spPr>
-        <p:style>
-          <a:lnRef idx="2">
-            <a:schemeClr val="accent1"/>
-          </a:lnRef>
-          <a:fillRef idx="0">
-            <a:schemeClr val="accent1"/>
-          </a:fillRef>
-          <a:effectRef idx="1">
-            <a:schemeClr val="accent1"/>
-          </a:effectRef>
-          <a:fontRef idx="minor">
-            <a:schemeClr val="tx1"/>
-          </a:fontRef>
-        </p:style>
-      </p:cxnSp>
-      <p:cxnSp>
-        <p:nvCxnSpPr>
-          <p:cNvPr id="43" name="Elbow Connector 42"/>
-          <p:cNvCxnSpPr>
-            <a:stCxn id="8" idx="3"/>
-            <a:endCxn id="18" idx="2"/>
-          </p:cNvCxnSpPr>
-          <p:nvPr/>
-        </p:nvCxnSpPr>
-        <p:spPr>
-          <a:xfrm flipV="1">
-            <a:off x="4699931" y="2655639"/>
-            <a:ext cx="380625" cy="655465"/>
-          </a:xfrm>
-          <a:prstGeom prst="bentConnector2">
-            <a:avLst/>
-          </a:prstGeom>
-          <a:ln>
-            <a:tailEnd type="arrow"/>
-          </a:ln>
-        </p:spPr>
-        <p:style>
-          <a:lnRef idx="2">
-            <a:schemeClr val="accent1"/>
-          </a:lnRef>
-          <a:fillRef idx="0">
-            <a:schemeClr val="accent1"/>
-          </a:fillRef>
-          <a:effectRef idx="1">
-            <a:schemeClr val="accent1"/>
-          </a:effectRef>
-          <a:fontRef idx="minor">
-            <a:schemeClr val="tx1"/>
-          </a:fontRef>
-        </p:style>
-      </p:cxnSp>
-      <p:cxnSp>
-        <p:nvCxnSpPr>
-          <p:cNvPr id="45" name="Elbow Connector 44"/>
-          <p:cNvCxnSpPr>
-            <a:stCxn id="18" idx="3"/>
-            <a:endCxn id="31" idx="1"/>
-          </p:cNvCxnSpPr>
-          <p:nvPr/>
-        </p:nvCxnSpPr>
-        <p:spPr>
-          <a:xfrm flipH="1">
-            <a:off x="5722356" y="2338139"/>
-            <a:ext cx="42919" cy="1019073"/>
-          </a:xfrm>
-          <a:prstGeom prst="bentConnector5">
-            <a:avLst>
-              <a:gd name="adj1" fmla="val -532631"/>
-              <a:gd name="adj2" fmla="val 47311"/>
-              <a:gd name="adj3" fmla="val 632631"/>
-            </a:avLst>
-          </a:prstGeom>
-          <a:ln>
-            <a:tailEnd type="arrow"/>
-          </a:ln>
-        </p:spPr>
-        <p:style>
-          <a:lnRef idx="2">
-            <a:schemeClr val="accent1"/>
-          </a:lnRef>
-          <a:fillRef idx="0">
-            <a:schemeClr val="accent1"/>
-          </a:fillRef>
-          <a:effectRef idx="1">
-            <a:schemeClr val="accent1"/>
-          </a:effectRef>
-          <a:fontRef idx="minor">
-            <a:schemeClr val="tx1"/>
-          </a:fontRef>
-        </p:style>
-      </p:cxnSp>
-      <p:pic>
-        <p:nvPicPr>
-          <p:cNvPr id="47" name="Picture 46"/>
-          <p:cNvPicPr>
-            <a:picLocks noChangeAspect="1"/>
-          </p:cNvPicPr>
-          <p:nvPr/>
-        </p:nvPicPr>
-        <p:blipFill>
-          <a:blip r:embed="rId2"/>
-          <a:stretch>
-            <a:fillRect/>
-          </a:stretch>
-        </p:blipFill>
-        <p:spPr>
-          <a:xfrm>
-            <a:off x="6374371" y="2221533"/>
-            <a:ext cx="1002010" cy="461048"/>
-          </a:xfrm>
-          <a:prstGeom prst="roundRect">
-            <a:avLst>
-              <a:gd name="adj" fmla="val 8594"/>
-            </a:avLst>
-          </a:prstGeom>
-          <a:solidFill>
-            <a:srgbClr val="FFFFFF">
-              <a:shade val="85000"/>
-            </a:srgbClr>
-          </a:solidFill>
-          <a:ln>
-            <a:noFill/>
-          </a:ln>
-          <a:effectLst>
-            <a:reflection blurRad="12700" stA="38000" endPos="28000" dist="5000" dir="5400000" sy="-100000" algn="bl" rotWithShape="0"/>
-          </a:effectLst>
-        </p:spPr>
-      </p:pic>
-      <p:sp>
-        <p:nvSpPr>
-          <p:cNvPr id="48" name="Up-Down Arrow 47"/>
-          <p:cNvSpPr/>
-          <p:nvPr/>
-        </p:nvSpPr>
-        <p:spPr>
-          <a:xfrm>
-            <a:off x="6759922" y="2622609"/>
-            <a:ext cx="484632" cy="632305"/>
-          </a:xfrm>
-          <a:prstGeom prst="upDownArrow">
-            <a:avLst/>
-          </a:prstGeom>
-        </p:spPr>
-        <p:style>
-          <a:lnRef idx="1">
-            <a:schemeClr val="accent1"/>
-          </a:lnRef>
-          <a:fillRef idx="3">
-            <a:schemeClr val="accent1"/>
-          </a:fillRef>
-          <a:effectRef idx="2">
-            <a:schemeClr val="accent1"/>
-          </a:effectRef>
-          <a:fontRef idx="minor">
-            <a:schemeClr val="lt1"/>
-          </a:fontRef>
-        </p:style>
-        <p:txBody>
-          <a:bodyPr rtlCol="0" anchor="ctr"/>
-          <a:lstStyle/>
-          <a:p>
-            <a:pPr algn="ctr"/>
-            <a:endParaRPr lang="en-US"/>
-          </a:p>
-        </p:txBody>
-      </p:sp>
-      <p:sp>
-        <p:nvSpPr>
-          <p:cNvPr id="49" name="TextBox 48"/>
-          <p:cNvSpPr txBox="1"/>
-          <p:nvPr/>
-        </p:nvSpPr>
-        <p:spPr>
-          <a:xfrm>
-            <a:off x="6445015" y="1852201"/>
-            <a:ext cx="1599078" cy="369332"/>
-          </a:xfrm>
-          <a:prstGeom prst="rect">
-            <a:avLst/>
-          </a:prstGeom>
-          <a:noFill/>
-        </p:spPr>
-        <p:txBody>
-          <a:bodyPr wrap="none" rtlCol="0">
-            <a:spAutoFit/>
-          </a:bodyPr>
-          <a:lstStyle/>
-          <a:p>
-            <a:r>
-              <a:rPr lang="en-US" dirty="0" smtClean="0"/>
-              <a:t>Naïve Bayesian</a:t>
-            </a:r>
-            <a:endParaRPr lang="en-US" dirty="0"/>
-          </a:p>
-        </p:txBody>
-      </p:sp>
-      <p:sp>
-        <p:nvSpPr>
-          <p:cNvPr id="51" name="Rounded Rectangle 50"/>
-          <p:cNvSpPr/>
-          <p:nvPr/>
-        </p:nvSpPr>
-        <p:spPr>
-          <a:xfrm>
-            <a:off x="7134428" y="5153116"/>
-            <a:ext cx="1369438" cy="635000"/>
-          </a:xfrm>
-          <a:prstGeom prst="roundRect">
-            <a:avLst/>
-          </a:prstGeom>
-        </p:spPr>
-        <p:style>
-          <a:lnRef idx="1">
-            <a:schemeClr val="accent2"/>
-          </a:lnRef>
-          <a:fillRef idx="2">
-            <a:schemeClr val="accent2"/>
-          </a:fillRef>
-          <a:effectRef idx="1">
-            <a:schemeClr val="accent2"/>
-          </a:effectRef>
-          <a:fontRef idx="minor">
-            <a:schemeClr val="dk1"/>
-          </a:fontRef>
-        </p:style>
-        <p:txBody>
-          <a:bodyPr rtlCol="0" anchor="ctr"/>
-          <a:lstStyle/>
-          <a:p>
-            <a:pPr algn="ctr"/>
-            <a:r>
-              <a:rPr lang="en-US" dirty="0" smtClean="0"/>
-              <a:t>Similarity</a:t>
-            </a:r>
-          </a:p>
-          <a:p>
-            <a:pPr algn="ctr"/>
-            <a:r>
-              <a:rPr lang="en-US" dirty="0" smtClean="0"/>
-              <a:t>Score</a:t>
-            </a:r>
-            <a:endParaRPr lang="en-US" dirty="0"/>
-          </a:p>
-        </p:txBody>
-      </p:sp>
-      <p:cxnSp>
-        <p:nvCxnSpPr>
-          <p:cNvPr id="57" name="Elbow Connector 56"/>
-          <p:cNvCxnSpPr>
-            <a:stCxn id="31" idx="3"/>
-            <a:endCxn id="51" idx="0"/>
-          </p:cNvCxnSpPr>
-          <p:nvPr/>
-        </p:nvCxnSpPr>
-        <p:spPr>
-          <a:xfrm>
-            <a:off x="7325871" y="3357212"/>
-            <a:ext cx="493276" cy="1795904"/>
-          </a:xfrm>
-          <a:prstGeom prst="bentConnector2">
-            <a:avLst/>
-          </a:prstGeom>
-          <a:ln>
-            <a:tailEnd type="arrow"/>
-          </a:ln>
-        </p:spPr>
-        <p:style>
-          <a:lnRef idx="2">
-            <a:schemeClr val="accent1"/>
-          </a:lnRef>
-          <a:fillRef idx="0">
-            <a:schemeClr val="accent1"/>
-          </a:fillRef>
-          <a:effectRef idx="1">
-            <a:schemeClr val="accent1"/>
-          </a:effectRef>
-          <a:fontRef idx="minor">
-            <a:schemeClr val="tx1"/>
-          </a:fontRef>
-        </p:style>
-      </p:cxnSp>
     </p:spTree>
     <p:extLst>
       <p:ext uri="{BB962C8B-B14F-4D97-AF65-F5344CB8AC3E}">
-        <p14:creationId xmlns:p14="http://schemas.microsoft.com/office/powerpoint/2010/main" val="2184806422"/>
+        <p14:creationId xmlns:p14="http://schemas.microsoft.com/office/powerpoint/2010/main" val="157436180"/>
       </p:ext>
     </p:extLst>
   </p:cSld>
@@ -7202,7 +7329,7 @@
           <a:p>
             <a:r>
               <a:rPr lang="en-US" dirty="0" smtClean="0"/>
-              <a:t>Evaluation Daemon</a:t>
+              <a:t>Evaluation Daemon Design</a:t>
             </a:r>
             <a:endParaRPr lang="en-US" dirty="0"/>
           </a:p>
@@ -7210,91 +7337,843 @@
       </p:sp>
       <p:sp>
         <p:nvSpPr>
-          <p:cNvPr id="3" name="Content Placeholder 2"/>
-          <p:cNvSpPr>
-            <a:spLocks noGrp="1"/>
-          </p:cNvSpPr>
-          <p:nvPr>
-            <p:ph idx="1"/>
-          </p:nvPr>
-        </p:nvSpPr>
-        <p:spPr/>
-        <p:txBody>
-          <a:bodyPr>
-            <a:normAutofit fontScale="92500" lnSpcReduction="10000"/>
+          <p:cNvPr id="6" name="Folded Corner 5"/>
+          <p:cNvSpPr/>
+          <p:nvPr/>
+        </p:nvSpPr>
+        <p:spPr>
+          <a:xfrm>
+            <a:off x="784944" y="2338139"/>
+            <a:ext cx="1502065" cy="802151"/>
+          </a:xfrm>
+          <a:prstGeom prst="foldedCorner">
+            <a:avLst/>
+          </a:prstGeom>
+        </p:spPr>
+        <p:style>
+          <a:lnRef idx="2">
+            <a:schemeClr val="accent1"/>
+          </a:lnRef>
+          <a:fillRef idx="1">
+            <a:schemeClr val="lt1"/>
+          </a:fillRef>
+          <a:effectRef idx="0">
+            <a:schemeClr val="accent1"/>
+          </a:effectRef>
+          <a:fontRef idx="minor">
+            <a:schemeClr val="dk1"/>
+          </a:fontRef>
+        </p:style>
+        <p:txBody>
+          <a:bodyPr rtlCol="0" anchor="ctr"/>
+          <a:lstStyle/>
+          <a:p>
+            <a:endParaRPr lang="en-US" dirty="0"/>
+          </a:p>
+        </p:txBody>
+      </p:sp>
+      <p:sp>
+        <p:nvSpPr>
+          <p:cNvPr id="7" name="Rounded Rectangle 6"/>
+          <p:cNvSpPr/>
+          <p:nvPr/>
+        </p:nvSpPr>
+        <p:spPr>
+          <a:xfrm>
+            <a:off x="2925468" y="1886526"/>
+            <a:ext cx="4570408" cy="2459182"/>
+          </a:xfrm>
+          <a:prstGeom prst="roundRect">
+            <a:avLst>
+              <a:gd name="adj" fmla="val 5041"/>
+            </a:avLst>
+          </a:prstGeom>
+        </p:spPr>
+        <p:style>
+          <a:lnRef idx="2">
+            <a:schemeClr val="accent1"/>
+          </a:lnRef>
+          <a:fillRef idx="1">
+            <a:schemeClr val="lt1"/>
+          </a:fillRef>
+          <a:effectRef idx="0">
+            <a:schemeClr val="accent1"/>
+          </a:effectRef>
+          <a:fontRef idx="minor">
+            <a:schemeClr val="dk1"/>
+          </a:fontRef>
+        </p:style>
+        <p:txBody>
+          <a:bodyPr rtlCol="0" anchor="t" anchorCtr="0"/>
+          <a:lstStyle/>
+          <a:p>
+            <a:r>
+              <a:rPr lang="en-US" b="1" dirty="0" smtClean="0"/>
+              <a:t>Evaluation</a:t>
+            </a:r>
+          </a:p>
+          <a:p>
+            <a:r>
+              <a:rPr lang="en-US" b="1" dirty="0" smtClean="0"/>
+              <a:t>Daemon</a:t>
+            </a:r>
+          </a:p>
+        </p:txBody>
+      </p:sp>
+      <p:sp>
+        <p:nvSpPr>
+          <p:cNvPr id="8" name="Rounded Rectangle 7"/>
+          <p:cNvSpPr/>
+          <p:nvPr/>
+        </p:nvSpPr>
+        <p:spPr>
+          <a:xfrm>
+            <a:off x="3096416" y="2938793"/>
+            <a:ext cx="1603515" cy="744621"/>
+          </a:xfrm>
+          <a:prstGeom prst="roundRect">
+            <a:avLst/>
+          </a:prstGeom>
+        </p:spPr>
+        <p:style>
+          <a:lnRef idx="1">
+            <a:schemeClr val="accent1"/>
+          </a:lnRef>
+          <a:fillRef idx="3">
+            <a:schemeClr val="accent1"/>
+          </a:fillRef>
+          <a:effectRef idx="2">
+            <a:schemeClr val="accent1"/>
+          </a:effectRef>
+          <a:fontRef idx="minor">
+            <a:schemeClr val="lt1"/>
+          </a:fontRef>
+        </p:style>
+        <p:txBody>
+          <a:bodyPr rtlCol="0" anchor="ctr"/>
+          <a:lstStyle/>
+          <a:p>
+            <a:pPr algn="ctr"/>
+            <a:r>
+              <a:rPr lang="en-US" dirty="0" smtClean="0"/>
+              <a:t>D2V</a:t>
+            </a:r>
+            <a:endParaRPr lang="en-US" dirty="0"/>
+          </a:p>
+        </p:txBody>
+      </p:sp>
+      <p:sp>
+        <p:nvSpPr>
+          <p:cNvPr id="9" name="Rounded Rectangle 8"/>
+          <p:cNvSpPr/>
+          <p:nvPr/>
+        </p:nvSpPr>
+        <p:spPr>
+          <a:xfrm>
+            <a:off x="4499746" y="4933753"/>
+            <a:ext cx="1747461" cy="1199191"/>
+          </a:xfrm>
+          <a:prstGeom prst="roundRect">
+            <a:avLst>
+              <a:gd name="adj" fmla="val 5041"/>
+            </a:avLst>
+          </a:prstGeom>
+        </p:spPr>
+        <p:style>
+          <a:lnRef idx="1">
+            <a:schemeClr val="accent5"/>
+          </a:lnRef>
+          <a:fillRef idx="2">
+            <a:schemeClr val="accent5"/>
+          </a:fillRef>
+          <a:effectRef idx="1">
+            <a:schemeClr val="accent5"/>
+          </a:effectRef>
+          <a:fontRef idx="minor">
+            <a:schemeClr val="dk1"/>
+          </a:fontRef>
+        </p:style>
+        <p:txBody>
+          <a:bodyPr rtlCol="0" anchor="ctr"/>
+          <a:lstStyle/>
+          <a:p>
+            <a:pPr algn="ctr"/>
+            <a:r>
+              <a:rPr lang="en-US" dirty="0" smtClean="0"/>
+              <a:t>PDVL</a:t>
+            </a:r>
+          </a:p>
+          <a:p>
+            <a:pPr algn="ctr"/>
+            <a:r>
+              <a:rPr lang="en-US" dirty="0" smtClean="0"/>
+              <a:t>(Personalized Document Vector List)</a:t>
+            </a:r>
+            <a:endParaRPr lang="en-US" dirty="0"/>
+          </a:p>
+        </p:txBody>
+      </p:sp>
+      <p:sp>
+        <p:nvSpPr>
+          <p:cNvPr id="10" name="Rounded Rectangle 9"/>
+          <p:cNvSpPr/>
+          <p:nvPr/>
+        </p:nvSpPr>
+        <p:spPr>
+          <a:xfrm>
+            <a:off x="2423928" y="5003799"/>
+            <a:ext cx="1806793" cy="1129145"/>
+          </a:xfrm>
+          <a:prstGeom prst="roundRect">
+            <a:avLst>
+              <a:gd name="adj" fmla="val 5041"/>
+            </a:avLst>
+          </a:prstGeom>
+        </p:spPr>
+        <p:style>
+          <a:lnRef idx="1">
+            <a:schemeClr val="dk1"/>
+          </a:lnRef>
+          <a:fillRef idx="2">
+            <a:schemeClr val="dk1"/>
+          </a:fillRef>
+          <a:effectRef idx="1">
+            <a:schemeClr val="dk1"/>
+          </a:effectRef>
+          <a:fontRef idx="minor">
+            <a:schemeClr val="dk1"/>
+          </a:fontRef>
+        </p:style>
+        <p:txBody>
+          <a:bodyPr rtlCol="0" anchor="ctr"/>
+          <a:lstStyle/>
+          <a:p>
+            <a:pPr algn="ctr"/>
+            <a:r>
+              <a:rPr lang="en-US" dirty="0" smtClean="0"/>
+              <a:t>GTT</a:t>
+            </a:r>
+          </a:p>
+          <a:p>
+            <a:pPr algn="ctr"/>
+            <a:r>
+              <a:rPr lang="en-US" dirty="0" smtClean="0"/>
+              <a:t>(Global Term ID Table)</a:t>
+            </a:r>
+            <a:endParaRPr lang="en-US" dirty="0"/>
+          </a:p>
+        </p:txBody>
+      </p:sp>
+      <p:sp>
+        <p:nvSpPr>
+          <p:cNvPr id="11" name="Folded Corner 10"/>
+          <p:cNvSpPr/>
+          <p:nvPr/>
+        </p:nvSpPr>
+        <p:spPr>
+          <a:xfrm>
+            <a:off x="684494" y="2221533"/>
+            <a:ext cx="1502065" cy="802151"/>
+          </a:xfrm>
+          <a:prstGeom prst="foldedCorner">
+            <a:avLst/>
+          </a:prstGeom>
+        </p:spPr>
+        <p:style>
+          <a:lnRef idx="2">
+            <a:schemeClr val="accent1"/>
+          </a:lnRef>
+          <a:fillRef idx="1">
+            <a:schemeClr val="lt1"/>
+          </a:fillRef>
+          <a:effectRef idx="0">
+            <a:schemeClr val="accent1"/>
+          </a:effectRef>
+          <a:fontRef idx="minor">
+            <a:schemeClr val="dk1"/>
+          </a:fontRef>
+        </p:style>
+        <p:txBody>
+          <a:bodyPr rtlCol="0" anchor="ctr"/>
+          <a:lstStyle/>
+          <a:p>
+            <a:pPr marL="285750" indent="-285750">
+              <a:buFont typeface="Arial"/>
+              <a:buChar char="•"/>
+            </a:pPr>
+            <a:r>
+              <a:rPr lang="en-US" dirty="0" smtClean="0"/>
+              <a:t>Plain Text</a:t>
+            </a:r>
+          </a:p>
+          <a:p>
+            <a:pPr marL="285750" indent="-285750">
+              <a:buFont typeface="Arial"/>
+              <a:buChar char="•"/>
+            </a:pPr>
+            <a:r>
+              <a:rPr lang="en-US" dirty="0" smtClean="0"/>
+              <a:t>User ID</a:t>
+            </a:r>
+            <a:endParaRPr lang="en-US" dirty="0"/>
+          </a:p>
+        </p:txBody>
+      </p:sp>
+      <p:cxnSp>
+        <p:nvCxnSpPr>
+          <p:cNvPr id="12" name="Elbow Connector 11"/>
+          <p:cNvCxnSpPr>
+            <a:stCxn id="11" idx="3"/>
+            <a:endCxn id="8" idx="1"/>
+          </p:cNvCxnSpPr>
+          <p:nvPr/>
+        </p:nvCxnSpPr>
+        <p:spPr>
+          <a:xfrm>
+            <a:off x="2186559" y="2622609"/>
+            <a:ext cx="909857" cy="688495"/>
+          </a:xfrm>
+          <a:prstGeom prst="bentConnector3">
+            <a:avLst/>
+          </a:prstGeom>
+          <a:ln>
+            <a:tailEnd type="arrow"/>
+          </a:ln>
+        </p:spPr>
+        <p:style>
+          <a:lnRef idx="2">
+            <a:schemeClr val="accent1"/>
+          </a:lnRef>
+          <a:fillRef idx="0">
+            <a:schemeClr val="accent1"/>
+          </a:fillRef>
+          <a:effectRef idx="1">
+            <a:schemeClr val="accent1"/>
+          </a:effectRef>
+          <a:fontRef idx="minor">
+            <a:schemeClr val="tx1"/>
+          </a:fontRef>
+        </p:style>
+      </p:cxnSp>
+      <p:cxnSp>
+        <p:nvCxnSpPr>
+          <p:cNvPr id="13" name="Elbow Connector 12"/>
+          <p:cNvCxnSpPr>
+            <a:stCxn id="10" idx="0"/>
+            <a:endCxn id="8" idx="2"/>
+          </p:cNvCxnSpPr>
+          <p:nvPr/>
+        </p:nvCxnSpPr>
+        <p:spPr>
+          <a:xfrm rot="5400000" flipH="1" flipV="1">
+            <a:off x="2952557" y="4058183"/>
+            <a:ext cx="1320385" cy="570849"/>
+          </a:xfrm>
+          <a:prstGeom prst="bentConnector3">
+            <a:avLst>
+              <a:gd name="adj1" fmla="val 50000"/>
+            </a:avLst>
+          </a:prstGeom>
+          <a:ln>
+            <a:prstDash val="dash"/>
+            <a:headEnd type="arrow"/>
+            <a:tailEnd type="arrow"/>
+          </a:ln>
+        </p:spPr>
+        <p:style>
+          <a:lnRef idx="2">
+            <a:schemeClr val="accent1"/>
+          </a:lnRef>
+          <a:fillRef idx="0">
+            <a:schemeClr val="accent1"/>
+          </a:fillRef>
+          <a:effectRef idx="1">
+            <a:schemeClr val="accent1"/>
+          </a:effectRef>
+          <a:fontRef idx="minor">
+            <a:schemeClr val="tx1"/>
+          </a:fontRef>
+        </p:style>
+      </p:cxnSp>
+      <p:sp>
+        <p:nvSpPr>
+          <p:cNvPr id="15" name="Rounded Rectangle 14"/>
+          <p:cNvSpPr/>
+          <p:nvPr/>
+        </p:nvSpPr>
+        <p:spPr>
+          <a:xfrm>
+            <a:off x="4499746" y="2101457"/>
+            <a:ext cx="1369438" cy="635000"/>
+          </a:xfrm>
+          <a:prstGeom prst="roundRect">
+            <a:avLst/>
+          </a:prstGeom>
+        </p:spPr>
+        <p:style>
+          <a:lnRef idx="1">
+            <a:schemeClr val="dk1"/>
+          </a:lnRef>
+          <a:fillRef idx="2">
+            <a:schemeClr val="dk1"/>
+          </a:fillRef>
+          <a:effectRef idx="1">
+            <a:schemeClr val="dk1"/>
+          </a:effectRef>
+          <a:fontRef idx="minor">
+            <a:schemeClr val="dk1"/>
+          </a:fontRef>
+        </p:style>
+        <p:txBody>
+          <a:bodyPr rtlCol="0" anchor="ctr"/>
+          <a:lstStyle/>
+          <a:p>
+            <a:pPr algn="ctr"/>
+            <a:r>
+              <a:rPr lang="en-US" dirty="0" smtClean="0"/>
+              <a:t>Document Vector</a:t>
+            </a:r>
+            <a:endParaRPr lang="en-US" dirty="0"/>
+          </a:p>
+        </p:txBody>
+      </p:sp>
+      <p:sp>
+        <p:nvSpPr>
+          <p:cNvPr id="17" name="Up Arrow Callout 16"/>
+          <p:cNvSpPr/>
+          <p:nvPr/>
+        </p:nvSpPr>
+        <p:spPr>
+          <a:xfrm>
+            <a:off x="784944" y="3391923"/>
+            <a:ext cx="1288470" cy="1611876"/>
+          </a:xfrm>
+          <a:prstGeom prst="upArrowCallout">
+            <a:avLst>
+              <a:gd name="adj1" fmla="val 21415"/>
+              <a:gd name="adj2" fmla="val 25000"/>
+              <a:gd name="adj3" fmla="val 19624"/>
+              <a:gd name="adj4" fmla="val 64977"/>
+            </a:avLst>
+          </a:prstGeom>
+        </p:spPr>
+        <p:style>
+          <a:lnRef idx="1">
+            <a:schemeClr val="dk1"/>
+          </a:lnRef>
+          <a:fillRef idx="2">
+            <a:schemeClr val="dk1"/>
+          </a:fillRef>
+          <a:effectRef idx="1">
+            <a:schemeClr val="dk1"/>
+          </a:effectRef>
+          <a:fontRef idx="minor">
+            <a:schemeClr val="dk1"/>
+          </a:fontRef>
+        </p:style>
+        <p:txBody>
+          <a:bodyPr rtlCol="0" anchor="ctr"/>
+          <a:lstStyle/>
+          <a:p>
+            <a:pPr algn="ctr"/>
+            <a:r>
+              <a:rPr lang="en-US" dirty="0" smtClean="0"/>
+              <a:t>News from Subscriptions</a:t>
+            </a:r>
+            <a:endParaRPr lang="en-US" dirty="0"/>
+          </a:p>
+        </p:txBody>
+      </p:sp>
+      <p:sp>
+        <p:nvSpPr>
+          <p:cNvPr id="18" name="Rounded Rectangle 17"/>
+          <p:cNvSpPr/>
+          <p:nvPr/>
+        </p:nvSpPr>
+        <p:spPr>
+          <a:xfrm>
+            <a:off x="4395837" y="2020639"/>
+            <a:ext cx="1369438" cy="635000"/>
+          </a:xfrm>
+          <a:prstGeom prst="roundRect">
+            <a:avLst/>
+          </a:prstGeom>
+        </p:spPr>
+        <p:style>
+          <a:lnRef idx="1">
+            <a:schemeClr val="accent2"/>
+          </a:lnRef>
+          <a:fillRef idx="2">
+            <a:schemeClr val="accent2"/>
+          </a:fillRef>
+          <a:effectRef idx="1">
+            <a:schemeClr val="accent2"/>
+          </a:effectRef>
+          <a:fontRef idx="minor">
+            <a:schemeClr val="dk1"/>
+          </a:fontRef>
+        </p:style>
+        <p:txBody>
+          <a:bodyPr rtlCol="0" anchor="ctr"/>
+          <a:lstStyle/>
+          <a:p>
+            <a:pPr algn="ctr"/>
+            <a:r>
+              <a:rPr lang="en-US" dirty="0" smtClean="0"/>
+              <a:t>Document Vector</a:t>
+            </a:r>
+            <a:endParaRPr lang="en-US" dirty="0"/>
+          </a:p>
+        </p:txBody>
+      </p:sp>
+      <p:sp>
+        <p:nvSpPr>
+          <p:cNvPr id="31" name="Rounded Rectangle 30"/>
+          <p:cNvSpPr/>
+          <p:nvPr/>
+        </p:nvSpPr>
+        <p:spPr>
+          <a:xfrm>
+            <a:off x="5722356" y="2984901"/>
+            <a:ext cx="1603515" cy="744621"/>
+          </a:xfrm>
+          <a:prstGeom prst="roundRect">
+            <a:avLst/>
+          </a:prstGeom>
+        </p:spPr>
+        <p:style>
+          <a:lnRef idx="1">
+            <a:schemeClr val="accent1"/>
+          </a:lnRef>
+          <a:fillRef idx="3">
+            <a:schemeClr val="accent1"/>
+          </a:fillRef>
+          <a:effectRef idx="2">
+            <a:schemeClr val="accent1"/>
+          </a:effectRef>
+          <a:fontRef idx="minor">
+            <a:schemeClr val="lt1"/>
+          </a:fontRef>
+        </p:style>
+        <p:txBody>
+          <a:bodyPr rtlCol="0" anchor="ctr"/>
+          <a:lstStyle/>
+          <a:p>
+            <a:pPr algn="ctr"/>
+            <a:r>
+              <a:rPr lang="en-US" dirty="0" smtClean="0"/>
+              <a:t>NVE</a:t>
+            </a:r>
+            <a:endParaRPr lang="en-US" dirty="0"/>
+          </a:p>
+        </p:txBody>
+      </p:sp>
+      <p:cxnSp>
+        <p:nvCxnSpPr>
+          <p:cNvPr id="35" name="Elbow Connector 34"/>
+          <p:cNvCxnSpPr>
+            <a:stCxn id="9" idx="0"/>
+            <a:endCxn id="31" idx="2"/>
+          </p:cNvCxnSpPr>
+          <p:nvPr/>
+        </p:nvCxnSpPr>
+        <p:spPr>
+          <a:xfrm rot="5400000" flipH="1" flipV="1">
+            <a:off x="5346680" y="3756320"/>
+            <a:ext cx="1204231" cy="1150637"/>
+          </a:xfrm>
+          <a:prstGeom prst="bentConnector3">
+            <a:avLst/>
+          </a:prstGeom>
+          <a:ln>
+            <a:tailEnd type="arrow"/>
+          </a:ln>
+        </p:spPr>
+        <p:style>
+          <a:lnRef idx="2">
+            <a:schemeClr val="accent1"/>
+          </a:lnRef>
+          <a:fillRef idx="0">
+            <a:schemeClr val="accent1"/>
+          </a:fillRef>
+          <a:effectRef idx="1">
+            <a:schemeClr val="accent1"/>
+          </a:effectRef>
+          <a:fontRef idx="minor">
+            <a:schemeClr val="tx1"/>
+          </a:fontRef>
+        </p:style>
+      </p:cxnSp>
+      <p:cxnSp>
+        <p:nvCxnSpPr>
+          <p:cNvPr id="43" name="Elbow Connector 42"/>
+          <p:cNvCxnSpPr>
+            <a:stCxn id="8" idx="3"/>
+            <a:endCxn id="18" idx="2"/>
+          </p:cNvCxnSpPr>
+          <p:nvPr/>
+        </p:nvCxnSpPr>
+        <p:spPr>
+          <a:xfrm flipV="1">
+            <a:off x="4699931" y="2655639"/>
+            <a:ext cx="380625" cy="655465"/>
+          </a:xfrm>
+          <a:prstGeom prst="bentConnector2">
+            <a:avLst/>
+          </a:prstGeom>
+          <a:ln>
+            <a:tailEnd type="arrow"/>
+          </a:ln>
+        </p:spPr>
+        <p:style>
+          <a:lnRef idx="2">
+            <a:schemeClr val="accent1"/>
+          </a:lnRef>
+          <a:fillRef idx="0">
+            <a:schemeClr val="accent1"/>
+          </a:fillRef>
+          <a:effectRef idx="1">
+            <a:schemeClr val="accent1"/>
+          </a:effectRef>
+          <a:fontRef idx="minor">
+            <a:schemeClr val="tx1"/>
+          </a:fontRef>
+        </p:style>
+      </p:cxnSp>
+      <p:cxnSp>
+        <p:nvCxnSpPr>
+          <p:cNvPr id="45" name="Elbow Connector 44"/>
+          <p:cNvCxnSpPr>
+            <a:stCxn id="18" idx="3"/>
+            <a:endCxn id="31" idx="1"/>
+          </p:cNvCxnSpPr>
+          <p:nvPr/>
+        </p:nvCxnSpPr>
+        <p:spPr>
+          <a:xfrm flipH="1">
+            <a:off x="5722356" y="2338139"/>
+            <a:ext cx="42919" cy="1019073"/>
+          </a:xfrm>
+          <a:prstGeom prst="bentConnector5">
+            <a:avLst>
+              <a:gd name="adj1" fmla="val -532631"/>
+              <a:gd name="adj2" fmla="val 47311"/>
+              <a:gd name="adj3" fmla="val 632631"/>
+            </a:avLst>
+          </a:prstGeom>
+          <a:ln>
+            <a:tailEnd type="arrow"/>
+          </a:ln>
+        </p:spPr>
+        <p:style>
+          <a:lnRef idx="2">
+            <a:schemeClr val="accent1"/>
+          </a:lnRef>
+          <a:fillRef idx="0">
+            <a:schemeClr val="accent1"/>
+          </a:fillRef>
+          <a:effectRef idx="1">
+            <a:schemeClr val="accent1"/>
+          </a:effectRef>
+          <a:fontRef idx="minor">
+            <a:schemeClr val="tx1"/>
+          </a:fontRef>
+        </p:style>
+      </p:cxnSp>
+      <p:pic>
+        <p:nvPicPr>
+          <p:cNvPr id="47" name="Picture 46"/>
+          <p:cNvPicPr>
+            <a:picLocks noChangeAspect="1"/>
+          </p:cNvPicPr>
+          <p:nvPr/>
+        </p:nvPicPr>
+        <p:blipFill>
+          <a:blip r:embed="rId2"/>
+          <a:stretch>
+            <a:fillRect/>
+          </a:stretch>
+        </p:blipFill>
+        <p:spPr>
+          <a:xfrm>
+            <a:off x="6374371" y="2221533"/>
+            <a:ext cx="1002010" cy="461048"/>
+          </a:xfrm>
+          <a:prstGeom prst="roundRect">
+            <a:avLst>
+              <a:gd name="adj" fmla="val 8594"/>
+            </a:avLst>
+          </a:prstGeom>
+          <a:solidFill>
+            <a:srgbClr val="FFFFFF">
+              <a:shade val="85000"/>
+            </a:srgbClr>
+          </a:solidFill>
+          <a:ln>
+            <a:noFill/>
+          </a:ln>
+          <a:effectLst>
+            <a:reflection blurRad="12700" stA="38000" endPos="28000" dist="5000" dir="5400000" sy="-100000" algn="bl" rotWithShape="0"/>
+          </a:effectLst>
+        </p:spPr>
+      </p:pic>
+      <p:sp>
+        <p:nvSpPr>
+          <p:cNvPr id="48" name="Up-Down Arrow 47"/>
+          <p:cNvSpPr/>
+          <p:nvPr/>
+        </p:nvSpPr>
+        <p:spPr>
+          <a:xfrm>
+            <a:off x="6759922" y="2622609"/>
+            <a:ext cx="484632" cy="632305"/>
+          </a:xfrm>
+          <a:prstGeom prst="upDownArrow">
+            <a:avLst/>
+          </a:prstGeom>
+        </p:spPr>
+        <p:style>
+          <a:lnRef idx="1">
+            <a:schemeClr val="accent1"/>
+          </a:lnRef>
+          <a:fillRef idx="3">
+            <a:schemeClr val="accent1"/>
+          </a:fillRef>
+          <a:effectRef idx="2">
+            <a:schemeClr val="accent1"/>
+          </a:effectRef>
+          <a:fontRef idx="minor">
+            <a:schemeClr val="lt1"/>
+          </a:fontRef>
+        </p:style>
+        <p:txBody>
+          <a:bodyPr rtlCol="0" anchor="ctr"/>
+          <a:lstStyle/>
+          <a:p>
+            <a:pPr algn="ctr"/>
+            <a:endParaRPr lang="en-US"/>
+          </a:p>
+        </p:txBody>
+      </p:sp>
+      <p:sp>
+        <p:nvSpPr>
+          <p:cNvPr id="49" name="TextBox 48"/>
+          <p:cNvSpPr txBox="1"/>
+          <p:nvPr/>
+        </p:nvSpPr>
+        <p:spPr>
+          <a:xfrm>
+            <a:off x="6445015" y="1852201"/>
+            <a:ext cx="1599078" cy="369332"/>
+          </a:xfrm>
+          <a:prstGeom prst="rect">
+            <a:avLst/>
+          </a:prstGeom>
+          <a:noFill/>
+        </p:spPr>
+        <p:txBody>
+          <a:bodyPr wrap="none" rtlCol="0">
+            <a:spAutoFit/>
           </a:bodyPr>
           <a:lstStyle/>
           <a:p>
             <a:r>
-              <a:rPr lang="en-US" b="1" dirty="0" smtClean="0"/>
-              <a:t>Input</a:t>
-            </a:r>
-            <a:r>
-              <a:rPr lang="en-US" dirty="0" smtClean="0"/>
-              <a:t>: Content Extracted News Documents from User Subscriptions</a:t>
-            </a:r>
-          </a:p>
-          <a:p>
-            <a:r>
-              <a:rPr lang="en-US" b="1" dirty="0"/>
-              <a:t>Output</a:t>
-            </a:r>
-            <a:r>
-              <a:rPr lang="en-US" dirty="0"/>
-              <a:t>: Similarity </a:t>
-            </a:r>
+              <a:rPr lang="en-US" dirty="0" smtClean="0"/>
+              <a:t>Naïve Bayesian</a:t>
+            </a:r>
+            <a:endParaRPr lang="en-US" dirty="0"/>
+          </a:p>
+        </p:txBody>
+      </p:sp>
+      <p:sp>
+        <p:nvSpPr>
+          <p:cNvPr id="51" name="Rounded Rectangle 50"/>
+          <p:cNvSpPr/>
+          <p:nvPr/>
+        </p:nvSpPr>
+        <p:spPr>
+          <a:xfrm>
+            <a:off x="7134428" y="5153116"/>
+            <a:ext cx="1369438" cy="635000"/>
+          </a:xfrm>
+          <a:prstGeom prst="roundRect">
+            <a:avLst/>
+          </a:prstGeom>
+        </p:spPr>
+        <p:style>
+          <a:lnRef idx="1">
+            <a:schemeClr val="accent2"/>
+          </a:lnRef>
+          <a:fillRef idx="2">
+            <a:schemeClr val="accent2"/>
+          </a:fillRef>
+          <a:effectRef idx="1">
+            <a:schemeClr val="accent2"/>
+          </a:effectRef>
+          <a:fontRef idx="minor">
+            <a:schemeClr val="dk1"/>
+          </a:fontRef>
+        </p:style>
+        <p:txBody>
+          <a:bodyPr rtlCol="0" anchor="ctr"/>
+          <a:lstStyle/>
+          <a:p>
+            <a:pPr algn="ctr"/>
+            <a:r>
+              <a:rPr lang="en-US" dirty="0" smtClean="0"/>
+              <a:t>Similarity</a:t>
+            </a:r>
+          </a:p>
+          <a:p>
+            <a:pPr algn="ctr"/>
             <a:r>
               <a:rPr lang="en-US" dirty="0" smtClean="0"/>
               <a:t>Score</a:t>
             </a:r>
-          </a:p>
-          <a:p>
-            <a:r>
-              <a:rPr lang="en-US" dirty="0" smtClean="0"/>
-              <a:t>Controls </a:t>
-            </a:r>
-            <a:r>
-              <a:rPr lang="en-US" b="1" dirty="0" smtClean="0"/>
-              <a:t>D2V</a:t>
-            </a:r>
-            <a:r>
-              <a:rPr lang="en-US" dirty="0" smtClean="0"/>
-              <a:t> to Generate Document Vectors</a:t>
-            </a:r>
-          </a:p>
-          <a:p>
-            <a:r>
-              <a:rPr lang="en-US" b="1" dirty="0" smtClean="0"/>
-              <a:t>NVE</a:t>
-            </a:r>
-            <a:r>
-              <a:rPr lang="en-US" dirty="0" smtClean="0"/>
-              <a:t> (Naïve Bayesian Evaluation) Compares Each Document Vector and PDVL for Similarity Measurement</a:t>
-            </a:r>
-          </a:p>
-          <a:p>
-            <a:r>
-              <a:rPr lang="en-US" dirty="0" smtClean="0"/>
-              <a:t>NVE Delegates a CUDA Kernel for </a:t>
-            </a:r>
-            <a:r>
-              <a:rPr lang="en-US" b="1" dirty="0" smtClean="0"/>
-              <a:t>Massive Multiplication</a:t>
-            </a:r>
-            <a:r>
-              <a:rPr lang="en-US" dirty="0" smtClean="0"/>
-              <a:t> Operations </a:t>
-            </a:r>
-          </a:p>
-          <a:p>
             <a:endParaRPr lang="en-US" dirty="0"/>
           </a:p>
         </p:txBody>
       </p:sp>
+      <p:cxnSp>
+        <p:nvCxnSpPr>
+          <p:cNvPr id="57" name="Elbow Connector 56"/>
+          <p:cNvCxnSpPr>
+            <a:stCxn id="31" idx="3"/>
+            <a:endCxn id="51" idx="0"/>
+          </p:cNvCxnSpPr>
+          <p:nvPr/>
+        </p:nvCxnSpPr>
+        <p:spPr>
+          <a:xfrm>
+            <a:off x="7325871" y="3357212"/>
+            <a:ext cx="493276" cy="1795904"/>
+          </a:xfrm>
+          <a:prstGeom prst="bentConnector2">
+            <a:avLst/>
+          </a:prstGeom>
+          <a:ln>
+            <a:tailEnd type="arrow"/>
+          </a:ln>
+        </p:spPr>
+        <p:style>
+          <a:lnRef idx="2">
+            <a:schemeClr val="accent1"/>
+          </a:lnRef>
+          <a:fillRef idx="0">
+            <a:schemeClr val="accent1"/>
+          </a:fillRef>
+          <a:effectRef idx="1">
+            <a:schemeClr val="accent1"/>
+          </a:effectRef>
+          <a:fontRef idx="minor">
+            <a:schemeClr val="tx1"/>
+          </a:fontRef>
+        </p:style>
+      </p:cxnSp>
     </p:spTree>
     <p:extLst>
       <p:ext uri="{BB962C8B-B14F-4D97-AF65-F5344CB8AC3E}">
-        <p14:creationId xmlns:p14="http://schemas.microsoft.com/office/powerpoint/2010/main" val="4134847056"/>
+        <p14:creationId xmlns:p14="http://schemas.microsoft.com/office/powerpoint/2010/main" val="2184806422"/>
       </p:ext>
     </p:extLst>
   </p:cSld>
@@ -7338,7 +8217,7 @@
           <a:p>
             <a:r>
               <a:rPr lang="en-US" dirty="0" smtClean="0"/>
-              <a:t>Major Software Components</a:t>
+              <a:t>Evaluation Daemon</a:t>
             </a:r>
             <a:endParaRPr lang="en-US" dirty="0"/>
           </a:p>
@@ -7357,60 +8236,69 @@
         <p:spPr/>
         <p:txBody>
           <a:bodyPr>
-            <a:normAutofit lnSpcReduction="10000"/>
+            <a:normAutofit fontScale="92500" lnSpcReduction="10000"/>
           </a:bodyPr>
           <a:lstStyle/>
           <a:p>
             <a:r>
-              <a:rPr lang="en-US" dirty="0" smtClean="0"/>
-              <a:t>D2V: Document to Vector</a:t>
-            </a:r>
-          </a:p>
-          <a:p>
-            <a:pPr lvl="1"/>
-            <a:r>
-              <a:rPr lang="en-US" dirty="0" smtClean="0"/>
-              <a:t>Converts Plain Text to Document Vector</a:t>
-            </a:r>
-          </a:p>
-          <a:p>
-            <a:pPr lvl="1"/>
-            <a:r>
-              <a:rPr lang="en-US" dirty="0" smtClean="0"/>
-              <a:t>Manages Global Term ID Table (Shared Across Conversion Sessions)</a:t>
-            </a:r>
-          </a:p>
-          <a:p>
-            <a:r>
-              <a:rPr lang="en-US" dirty="0" smtClean="0"/>
-              <a:t>NVE: Naïve Bayesian Evaluation</a:t>
-            </a:r>
-          </a:p>
-          <a:p>
-            <a:pPr lvl="1"/>
-            <a:r>
-              <a:rPr lang="en-US" dirty="0" smtClean="0"/>
-              <a:t>CUDA Accelerated Naïve Bayesian Algorithm</a:t>
-            </a:r>
-          </a:p>
-          <a:p>
-            <a:pPr lvl="1"/>
-            <a:r>
-              <a:rPr lang="en-US" dirty="0" smtClean="0"/>
-              <a:t>Score Similarity of a Document Vector and PDVL</a:t>
-            </a:r>
-          </a:p>
-          <a:p>
-            <a:r>
-              <a:rPr lang="en-US" dirty="0" smtClean="0"/>
-              <a:t>Content Extraction</a:t>
-            </a:r>
-          </a:p>
-          <a:p>
-            <a:pPr lvl="1"/>
-            <a:r>
-              <a:rPr lang="en-US" dirty="0" smtClean="0"/>
-              <a:t>Strips out HTML tags from Internet News Article</a:t>
+              <a:rPr lang="en-US" b="1" dirty="0" smtClean="0"/>
+              <a:t>Input</a:t>
+            </a:r>
+            <a:r>
+              <a:rPr lang="en-US" dirty="0" smtClean="0"/>
+              <a:t>: Content Extracted News Documents from User Subscriptions</a:t>
+            </a:r>
+          </a:p>
+          <a:p>
+            <a:r>
+              <a:rPr lang="en-US" b="1" dirty="0"/>
+              <a:t>Output</a:t>
+            </a:r>
+            <a:r>
+              <a:rPr lang="en-US" dirty="0"/>
+              <a:t>: Similarity </a:t>
+            </a:r>
+            <a:r>
+              <a:rPr lang="en-US" dirty="0" smtClean="0"/>
+              <a:t>Score</a:t>
+            </a:r>
+          </a:p>
+          <a:p>
+            <a:r>
+              <a:rPr lang="en-US" dirty="0" smtClean="0"/>
+              <a:t>Controls </a:t>
+            </a:r>
+            <a:r>
+              <a:rPr lang="en-US" b="1" dirty="0" smtClean="0"/>
+              <a:t>D2V</a:t>
+            </a:r>
+            <a:r>
+              <a:rPr lang="en-US" dirty="0" smtClean="0"/>
+              <a:t> to Generate Document Vectors</a:t>
+            </a:r>
+          </a:p>
+          <a:p>
+            <a:r>
+              <a:rPr lang="en-US" b="1" dirty="0" smtClean="0"/>
+              <a:t>NVE</a:t>
+            </a:r>
+            <a:r>
+              <a:rPr lang="en-US" dirty="0" smtClean="0"/>
+              <a:t> (Naïve Bayesian Evaluation) Compares Each Document Vector and PDVL for Similarity Measurement</a:t>
+            </a:r>
+          </a:p>
+          <a:p>
+            <a:r>
+              <a:rPr lang="en-US" dirty="0" smtClean="0"/>
+              <a:t>NVE Delegates a CUDA Kernel for </a:t>
+            </a:r>
+            <a:r>
+              <a:rPr lang="en-US" b="1" dirty="0" smtClean="0"/>
+              <a:t>Massive Multiplication</a:t>
+            </a:r>
+            <a:r>
+              <a:rPr lang="en-US" dirty="0" smtClean="0"/>
+              <a:t> Operations </a:t>
             </a:r>
           </a:p>
           <a:p>
@@ -7421,7 +8309,7 @@
     </p:spTree>
     <p:extLst>
       <p:ext uri="{BB962C8B-B14F-4D97-AF65-F5344CB8AC3E}">
-        <p14:creationId xmlns:p14="http://schemas.microsoft.com/office/powerpoint/2010/main" val="326765645"/>
+        <p14:creationId xmlns:p14="http://schemas.microsoft.com/office/powerpoint/2010/main" val="4134847056"/>
       </p:ext>
     </p:extLst>
   </p:cSld>

</xml_diff>